<commit_message>
week 7 and project
</commit_message>
<xml_diff>
--- a/course_material/week_07/week_07_presentation.pptx
+++ b/course_material/week_07/week_07_presentation.pptx
@@ -5,25 +5,26 @@
     <p:sldMasterId id="2147483696" r:id="rId1"/>
   </p:sldMasterIdLst>
   <p:notesMasterIdLst>
-    <p:notesMasterId r:id="rId18"/>
+    <p:notesMasterId r:id="rId19"/>
   </p:notesMasterIdLst>
   <p:sldIdLst>
     <p:sldId id="256" r:id="rId2"/>
     <p:sldId id="274" r:id="rId3"/>
     <p:sldId id="259" r:id="rId4"/>
     <p:sldId id="310" r:id="rId5"/>
-    <p:sldId id="262" r:id="rId6"/>
-    <p:sldId id="304" r:id="rId7"/>
-    <p:sldId id="303" r:id="rId8"/>
-    <p:sldId id="265" r:id="rId9"/>
-    <p:sldId id="302" r:id="rId10"/>
-    <p:sldId id="286" r:id="rId11"/>
-    <p:sldId id="306" r:id="rId12"/>
-    <p:sldId id="308" r:id="rId13"/>
-    <p:sldId id="285" r:id="rId14"/>
-    <p:sldId id="298" r:id="rId15"/>
-    <p:sldId id="309" r:id="rId16"/>
-    <p:sldId id="271" r:id="rId17"/>
+    <p:sldId id="311" r:id="rId6"/>
+    <p:sldId id="262" r:id="rId7"/>
+    <p:sldId id="304" r:id="rId8"/>
+    <p:sldId id="303" r:id="rId9"/>
+    <p:sldId id="265" r:id="rId10"/>
+    <p:sldId id="302" r:id="rId11"/>
+    <p:sldId id="286" r:id="rId12"/>
+    <p:sldId id="306" r:id="rId13"/>
+    <p:sldId id="308" r:id="rId14"/>
+    <p:sldId id="285" r:id="rId15"/>
+    <p:sldId id="298" r:id="rId16"/>
+    <p:sldId id="309" r:id="rId17"/>
+    <p:sldId id="271" r:id="rId18"/>
   </p:sldIdLst>
   <p:sldSz cx="12192000" cy="6858000"/>
   <p:notesSz cx="6858000" cy="9144000"/>
@@ -1838,7 +1839,7 @@
           <a:p>
             <a:fld id="{5CF9EFDB-215C-4120-ADCB-EAD745B7163E}" type="datetimeFigureOut">
               <a:rPr lang="en-US" smtClean="0"/>
-              <a:t>10/21/2021</a:t>
+              <a:t>10/26/2021</a:t>
             </a:fld>
             <a:endParaRPr lang="en-US"/>
           </a:p>
@@ -2170,7 +2171,7 @@
           <a:p>
             <a:fld id="{D47C6294-E177-4C13-B455-A28BB6E433F0}" type="slidenum">
               <a:rPr lang="en-US" smtClean="0"/>
-              <a:t>14</a:t>
+              <a:t>15</a:t>
             </a:fld>
             <a:endParaRPr lang="en-US"/>
           </a:p>
@@ -2383,7 +2384,7 @@
           <a:p>
             <a:fld id="{ACF1A1B0-862D-4909-A7DB-D8ADA062DFCA}" type="datetimeFigureOut">
               <a:rPr lang="en-US" dirty="0"/>
-              <a:t>10/21/2021</a:t>
+              <a:t>10/26/2021</a:t>
             </a:fld>
             <a:endParaRPr lang="en-US"/>
           </a:p>
@@ -2606,7 +2607,7 @@
           <a:p>
             <a:fld id="{7B156144-9CB7-4E3A-B87E-A382F9BE05EF}" type="datetimeFigureOut">
               <a:rPr lang="en-US" dirty="0"/>
-              <a:t>10/21/2021</a:t>
+              <a:t>10/26/2021</a:t>
             </a:fld>
             <a:endParaRPr lang="en-US"/>
           </a:p>
@@ -2784,7 +2785,7 @@
           <a:p>
             <a:fld id="{2643D55F-46AB-4791-9172-4FA8DD3A6A9C}" type="datetimeFigureOut">
               <a:rPr lang="en-US" dirty="0"/>
-              <a:t>10/21/2021</a:t>
+              <a:t>10/26/2021</a:t>
             </a:fld>
             <a:endParaRPr lang="en-US"/>
           </a:p>
@@ -3019,7 +3020,7 @@
           <a:p>
             <a:fld id="{6BA3FB29-F7C9-405C-849A-3AD6AC788A46}" type="datetime1">
               <a:rPr lang="en-US" smtClean="0"/>
-              <a:t>10/21/2021</a:t>
+              <a:t>10/26/2021</a:t>
             </a:fld>
             <a:endParaRPr lang="en-US" dirty="0"/>
           </a:p>
@@ -3228,7 +3229,7 @@
           <a:p>
             <a:fld id="{58026881-8A08-449C-8D73-E5F201F814C1}" type="datetimeFigureOut">
               <a:rPr lang="en-US" dirty="0"/>
-              <a:t>10/21/2021</a:t>
+              <a:t>10/26/2021</a:t>
             </a:fld>
             <a:endParaRPr lang="en-US"/>
           </a:p>
@@ -3518,7 +3519,7 @@
           <a:p>
             <a:fld id="{1BEB5A5E-0C07-4E93-A112-D37B4D166B30}" type="datetimeFigureOut">
               <a:rPr lang="en-US" dirty="0"/>
-              <a:t>10/21/2021</a:t>
+              <a:t>10/26/2021</a:t>
             </a:fld>
             <a:endParaRPr lang="en-US"/>
           </a:p>
@@ -3841,7 +3842,7 @@
           <a:p>
             <a:fld id="{9E1F71C5-DC57-4358-A1EA-30C08AF6E3C5}" type="datetimeFigureOut">
               <a:rPr lang="en-US" dirty="0"/>
-              <a:t>10/21/2021</a:t>
+              <a:t>10/26/2021</a:t>
             </a:fld>
             <a:endParaRPr lang="en-US"/>
           </a:p>
@@ -4250,7 +4251,7 @@
           <a:p>
             <a:fld id="{12571DBA-DE60-4731-B773-47AAA185C143}" type="datetimeFigureOut">
               <a:rPr lang="en-US" dirty="0"/>
-              <a:t>10/21/2021</a:t>
+              <a:t>10/26/2021</a:t>
             </a:fld>
             <a:endParaRPr lang="en-US"/>
           </a:p>
@@ -4367,7 +4368,7 @@
           <a:p>
             <a:fld id="{4F170639-886C-4FCF-9EAB-ABB5DA3F3F4A}" type="datetimeFigureOut">
               <a:rPr lang="en-US" dirty="0"/>
-              <a:t>10/21/2021</a:t>
+              <a:t>10/26/2021</a:t>
             </a:fld>
             <a:endParaRPr lang="en-US"/>
           </a:p>
@@ -4462,7 +4463,7 @@
           <a:p>
             <a:fld id="{34C4A628-C83B-4C66-83F4-1711CE3738FD}" type="datetimeFigureOut">
               <a:rPr lang="en-US" dirty="0"/>
-              <a:t>10/21/2021</a:t>
+              <a:t>10/26/2021</a:t>
             </a:fld>
             <a:endParaRPr lang="en-US"/>
           </a:p>
@@ -4747,7 +4748,7 @@
           <a:p>
             <a:fld id="{B88C1D73-9400-43CA-A37F-F9B7D00DE14C}" type="datetimeFigureOut">
               <a:rPr lang="en-US" dirty="0"/>
-              <a:t>10/21/2021</a:t>
+              <a:t>10/26/2021</a:t>
             </a:fld>
             <a:endParaRPr lang="en-US"/>
           </a:p>
@@ -5019,7 +5020,7 @@
           <a:p>
             <a:fld id="{188B7711-B905-4633-B4D7-6F3A49A2E7D9}" type="datetimeFigureOut">
               <a:rPr lang="en-US" dirty="0"/>
-              <a:t>10/21/2021</a:t>
+              <a:t>10/26/2021</a:t>
             </a:fld>
             <a:endParaRPr lang="en-US"/>
           </a:p>
@@ -5269,7 +5270,7 @@
             <a:fld id="{89C235CF-BDA2-4E7E-8BBD-350479985E74}" type="datetimeFigureOut">
               <a:rPr lang="en-US" dirty="0"/>
               <a:pPr/>
-              <a:t>10/21/2021</a:t>
+              <a:t>10/26/2021</a:t>
             </a:fld>
             <a:endParaRPr lang="en-US"/>
           </a:p>
@@ -5817,2106 +5818,6 @@
 <file path=ppt/slides/slide10.xml><?xml version="1.0" encoding="utf-8"?>
 <p:sld xmlns:a="http://schemas.openxmlformats.org/drawingml/2006/main" xmlns:r="http://schemas.openxmlformats.org/officeDocument/2006/relationships" xmlns:p="http://schemas.openxmlformats.org/presentationml/2006/main">
   <p:cSld>
-    <p:spTree>
-      <p:nvGrpSpPr>
-        <p:cNvPr id="1" name=""/>
-        <p:cNvGrpSpPr/>
-        <p:nvPr/>
-      </p:nvGrpSpPr>
-      <p:grpSpPr>
-        <a:xfrm>
-          <a:off x="0" y="0"/>
-          <a:ext cx="0" cy="0"/>
-          <a:chOff x="0" y="0"/>
-          <a:chExt cx="0" cy="0"/>
-        </a:xfrm>
-      </p:grpSpPr>
-      <p:pic>
-        <p:nvPicPr>
-          <p:cNvPr id="10" name="Picture 9" descr="Diagram&#10;&#10;Description automatically generated">
-            <a:extLst>
-              <a:ext uri="{FF2B5EF4-FFF2-40B4-BE49-F238E27FC236}">
-                <a16:creationId xmlns:a16="http://schemas.microsoft.com/office/drawing/2014/main" id="{C35F24F2-D1A4-43CC-8252-35E7BA7D68B8}"/>
-              </a:ext>
-            </a:extLst>
-          </p:cNvPr>
-          <p:cNvPicPr>
-            <a:picLocks noChangeAspect="1"/>
-          </p:cNvPicPr>
-          <p:nvPr/>
-        </p:nvPicPr>
-        <p:blipFill>
-          <a:blip r:embed="rId2">
-            <a:extLst>
-              <a:ext uri="{28A0092B-C50C-407E-A947-70E740481C1C}">
-                <a14:useLocalDpi xmlns:a14="http://schemas.microsoft.com/office/drawing/2010/main" val="0"/>
-              </a:ext>
-            </a:extLst>
-          </a:blip>
-          <a:stretch>
-            <a:fillRect/>
-          </a:stretch>
-        </p:blipFill>
-        <p:spPr>
-          <a:xfrm>
-            <a:off x="1523999" y="0"/>
-            <a:ext cx="9077325" cy="6807994"/>
-          </a:xfrm>
-          <a:prstGeom prst="rect">
-            <a:avLst/>
-          </a:prstGeom>
-        </p:spPr>
-      </p:pic>
-    </p:spTree>
-    <p:extLst>
-      <p:ext uri="{BB962C8B-B14F-4D97-AF65-F5344CB8AC3E}">
-        <p14:creationId xmlns:p14="http://schemas.microsoft.com/office/powerpoint/2010/main" val="1282836977"/>
-      </p:ext>
-    </p:extLst>
-  </p:cSld>
-  <p:clrMapOvr>
-    <a:masterClrMapping/>
-  </p:clrMapOvr>
-</p:sld>
-</file>
-
-<file path=ppt/slides/slide11.xml><?xml version="1.0" encoding="utf-8"?>
-<p:sld xmlns:a="http://schemas.openxmlformats.org/drawingml/2006/main" xmlns:r="http://schemas.openxmlformats.org/officeDocument/2006/relationships" xmlns:p="http://schemas.openxmlformats.org/presentationml/2006/main">
-  <p:cSld>
-    <p:spTree>
-      <p:nvGrpSpPr>
-        <p:cNvPr id="1" name=""/>
-        <p:cNvGrpSpPr/>
-        <p:nvPr/>
-      </p:nvGrpSpPr>
-      <p:grpSpPr>
-        <a:xfrm>
-          <a:off x="0" y="0"/>
-          <a:ext cx="0" cy="0"/>
-          <a:chOff x="0" y="0"/>
-          <a:chExt cx="0" cy="0"/>
-        </a:xfrm>
-      </p:grpSpPr>
-      <p:sp>
-        <p:nvSpPr>
-          <p:cNvPr id="2" name="Title 1">
-            <a:extLst>
-              <a:ext uri="{FF2B5EF4-FFF2-40B4-BE49-F238E27FC236}">
-                <a16:creationId xmlns:a16="http://schemas.microsoft.com/office/drawing/2014/main" id="{4FAD9F3F-67F1-4324-876E-D6F7A55ACEAB}"/>
-              </a:ext>
-            </a:extLst>
-          </p:cNvPr>
-          <p:cNvSpPr>
-            <a:spLocks noGrp="1"/>
-          </p:cNvSpPr>
-          <p:nvPr>
-            <p:ph type="title"/>
-          </p:nvPr>
-        </p:nvSpPr>
-        <p:spPr>
-          <a:xfrm>
-            <a:off x="685800" y="764373"/>
-            <a:ext cx="5410200" cy="1293028"/>
-          </a:xfrm>
-        </p:spPr>
-        <p:txBody>
-          <a:bodyPr>
-            <a:normAutofit/>
-          </a:bodyPr>
-          <a:lstStyle/>
-          <a:p>
-            <a:r>
-              <a:rPr lang="en-US" sz="3200" dirty="0"/>
-              <a:t>Data Stewardship</a:t>
-            </a:r>
-          </a:p>
-        </p:txBody>
-      </p:sp>
-      <p:sp>
-        <p:nvSpPr>
-          <p:cNvPr id="3" name="Content Placeholder 2">
-            <a:extLst>
-              <a:ext uri="{FF2B5EF4-FFF2-40B4-BE49-F238E27FC236}">
-                <a16:creationId xmlns:a16="http://schemas.microsoft.com/office/drawing/2014/main" id="{9DC507E5-73C8-4252-9C8E-68C575B6F44C}"/>
-              </a:ext>
-            </a:extLst>
-          </p:cNvPr>
-          <p:cNvSpPr>
-            <a:spLocks noGrp="1"/>
-          </p:cNvSpPr>
-          <p:nvPr>
-            <p:ph idx="1"/>
-          </p:nvPr>
-        </p:nvSpPr>
-        <p:spPr>
-          <a:xfrm>
-            <a:off x="685801" y="2194560"/>
-            <a:ext cx="3306742" cy="4024125"/>
-          </a:xfrm>
-        </p:spPr>
-        <p:txBody>
-          <a:bodyPr>
-            <a:normAutofit/>
-          </a:bodyPr>
-          <a:lstStyle/>
-          <a:p>
-            <a:r>
-              <a:rPr lang="en-US" sz="1600" dirty="0"/>
-              <a:t>Rule of thumb for what data documentation needs </a:t>
-            </a:r>
-            <a:r>
-              <a:rPr lang="en-US" sz="1600"/>
-              <a:t>to achieve</a:t>
-            </a:r>
-            <a:endParaRPr lang="en-US" sz="1600" dirty="0"/>
-          </a:p>
-        </p:txBody>
-      </p:sp>
-      <p:pic>
-        <p:nvPicPr>
-          <p:cNvPr id="1026" name="Picture 2">
-            <a:extLst>
-              <a:ext uri="{FF2B5EF4-FFF2-40B4-BE49-F238E27FC236}">
-                <a16:creationId xmlns:a16="http://schemas.microsoft.com/office/drawing/2014/main" id="{C3DA6FBF-943A-49DE-9105-664CCEC147B0}"/>
-              </a:ext>
-            </a:extLst>
-          </p:cNvPr>
-          <p:cNvPicPr>
-            <a:picLocks noChangeAspect="1" noChangeArrowheads="1"/>
-          </p:cNvPicPr>
-          <p:nvPr/>
-        </p:nvPicPr>
-        <p:blipFill>
-          <a:blip r:embed="rId2">
-            <a:extLst>
-              <a:ext uri="{28A0092B-C50C-407E-A947-70E740481C1C}">
-                <a14:useLocalDpi xmlns:a14="http://schemas.microsoft.com/office/drawing/2010/main" val="0"/>
-              </a:ext>
-            </a:extLst>
-          </a:blip>
-          <a:stretch>
-            <a:fillRect/>
-          </a:stretch>
-        </p:blipFill>
-        <p:spPr bwMode="auto">
-          <a:xfrm>
-            <a:off x="4955339" y="2598711"/>
-            <a:ext cx="6127287" cy="2083277"/>
-          </a:xfrm>
-          <a:prstGeom prst="rect">
-            <a:avLst/>
-          </a:prstGeom>
-          <a:noFill/>
-          <a:extLst>
-            <a:ext uri="{909E8E84-426E-40DD-AFC4-6F175D3DCCD1}">
-              <a14:hiddenFill xmlns:a14="http://schemas.microsoft.com/office/drawing/2010/main">
-                <a:solidFill>
-                  <a:srgbClr val="FFFFFF"/>
-                </a:solidFill>
-              </a14:hiddenFill>
-            </a:ext>
-          </a:extLst>
-        </p:spPr>
-      </p:pic>
-    </p:spTree>
-    <p:extLst>
-      <p:ext uri="{BB962C8B-B14F-4D97-AF65-F5344CB8AC3E}">
-        <p14:creationId xmlns:p14="http://schemas.microsoft.com/office/powerpoint/2010/main" val="4192105085"/>
-      </p:ext>
-    </p:extLst>
-  </p:cSld>
-  <p:clrMapOvr>
-    <a:masterClrMapping/>
-  </p:clrMapOvr>
-</p:sld>
-</file>
-
-<file path=ppt/slides/slide12.xml><?xml version="1.0" encoding="utf-8"?>
-<p:sld xmlns:a="http://schemas.openxmlformats.org/drawingml/2006/main" xmlns:r="http://schemas.openxmlformats.org/officeDocument/2006/relationships" xmlns:p="http://schemas.openxmlformats.org/presentationml/2006/main">
-  <p:cSld>
-    <p:spTree>
-      <p:nvGrpSpPr>
-        <p:cNvPr id="1" name=""/>
-        <p:cNvGrpSpPr/>
-        <p:nvPr/>
-      </p:nvGrpSpPr>
-      <p:grpSpPr>
-        <a:xfrm>
-          <a:off x="0" y="0"/>
-          <a:ext cx="0" cy="0"/>
-          <a:chOff x="0" y="0"/>
-          <a:chExt cx="0" cy="0"/>
-        </a:xfrm>
-      </p:grpSpPr>
-      <p:sp>
-        <p:nvSpPr>
-          <p:cNvPr id="2" name="Title 1">
-            <a:extLst>
-              <a:ext uri="{FF2B5EF4-FFF2-40B4-BE49-F238E27FC236}">
-                <a16:creationId xmlns:a16="http://schemas.microsoft.com/office/drawing/2014/main" id="{64963815-EAA3-4804-B5A8-B0A8CA5778B7}"/>
-              </a:ext>
-            </a:extLst>
-          </p:cNvPr>
-          <p:cNvSpPr>
-            <a:spLocks noGrp="1"/>
-          </p:cNvSpPr>
-          <p:nvPr>
-            <p:ph type="title"/>
-          </p:nvPr>
-        </p:nvSpPr>
-        <p:spPr/>
-        <p:txBody>
-          <a:bodyPr/>
-          <a:lstStyle/>
-          <a:p>
-            <a:r>
-              <a:rPr lang="en-US" dirty="0"/>
-              <a:t>Practice (10 minutes)</a:t>
-            </a:r>
-          </a:p>
-        </p:txBody>
-      </p:sp>
-      <p:sp>
-        <p:nvSpPr>
-          <p:cNvPr id="3" name="Content Placeholder 2">
-            <a:extLst>
-              <a:ext uri="{FF2B5EF4-FFF2-40B4-BE49-F238E27FC236}">
-                <a16:creationId xmlns:a16="http://schemas.microsoft.com/office/drawing/2014/main" id="{AEC957F8-C263-4013-8EA9-46F315961E1E}"/>
-              </a:ext>
-            </a:extLst>
-          </p:cNvPr>
-          <p:cNvSpPr>
-            <a:spLocks noGrp="1"/>
-          </p:cNvSpPr>
-          <p:nvPr>
-            <p:ph idx="1"/>
-          </p:nvPr>
-        </p:nvSpPr>
-        <p:spPr/>
-        <p:txBody>
-          <a:bodyPr/>
-          <a:lstStyle/>
-          <a:p>
-            <a:pPr marL="0" indent="0">
-              <a:buNone/>
-            </a:pPr>
-            <a:r>
-              <a:rPr lang="en-US" dirty="0"/>
-              <a:t>1. Create an account on lucidchart.com </a:t>
-            </a:r>
-          </a:p>
-          <a:p>
-            <a:pPr marL="0" indent="0">
-              <a:buNone/>
-            </a:pPr>
-            <a:r>
-              <a:rPr lang="en-US" dirty="0"/>
-              <a:t>2. Create a basic ERD for a gym.  You can just use entities, you do not need to use tables. Include the relationship and cardinality</a:t>
-            </a:r>
-          </a:p>
-        </p:txBody>
-      </p:sp>
-    </p:spTree>
-    <p:extLst>
-      <p:ext uri="{BB962C8B-B14F-4D97-AF65-F5344CB8AC3E}">
-        <p14:creationId xmlns:p14="http://schemas.microsoft.com/office/powerpoint/2010/main" val="1393956586"/>
-      </p:ext>
-    </p:extLst>
-  </p:cSld>
-  <p:clrMapOvr>
-    <a:masterClrMapping/>
-  </p:clrMapOvr>
-</p:sld>
-</file>
-
-<file path=ppt/slides/slide13.xml><?xml version="1.0" encoding="utf-8"?>
-<p:sld xmlns:a="http://schemas.openxmlformats.org/drawingml/2006/main" xmlns:r="http://schemas.openxmlformats.org/officeDocument/2006/relationships" xmlns:p="http://schemas.openxmlformats.org/presentationml/2006/main">
-  <p:cSld>
-    <p:spTree>
-      <p:nvGrpSpPr>
-        <p:cNvPr id="1" name=""/>
-        <p:cNvGrpSpPr/>
-        <p:nvPr/>
-      </p:nvGrpSpPr>
-      <p:grpSpPr>
-        <a:xfrm>
-          <a:off x="0" y="0"/>
-          <a:ext cx="0" cy="0"/>
-          <a:chOff x="0" y="0"/>
-          <a:chExt cx="0" cy="0"/>
-        </a:xfrm>
-      </p:grpSpPr>
-      <p:sp>
-        <p:nvSpPr>
-          <p:cNvPr id="4" name="Title 3">
-            <a:extLst>
-              <a:ext uri="{FF2B5EF4-FFF2-40B4-BE49-F238E27FC236}">
-                <a16:creationId xmlns:a16="http://schemas.microsoft.com/office/drawing/2014/main" id="{297BDE90-8DCF-4039-AB05-11C3F09C3813}"/>
-              </a:ext>
-            </a:extLst>
-          </p:cNvPr>
-          <p:cNvSpPr>
-            <a:spLocks noGrp="1"/>
-          </p:cNvSpPr>
-          <p:nvPr>
-            <p:ph type="ctrTitle"/>
-          </p:nvPr>
-        </p:nvSpPr>
-        <p:spPr/>
-        <p:txBody>
-          <a:bodyPr/>
-          <a:lstStyle/>
-          <a:p>
-            <a:r>
-              <a:rPr lang="en-US" dirty="0"/>
-              <a:t>Break (15 Minutes)</a:t>
-            </a:r>
-          </a:p>
-        </p:txBody>
-      </p:sp>
-      <p:sp>
-        <p:nvSpPr>
-          <p:cNvPr id="5" name="Subtitle 4">
-            <a:extLst>
-              <a:ext uri="{FF2B5EF4-FFF2-40B4-BE49-F238E27FC236}">
-                <a16:creationId xmlns:a16="http://schemas.microsoft.com/office/drawing/2014/main" id="{AE43AD4D-53BE-4D90-B4EE-A313556AC5A9}"/>
-              </a:ext>
-            </a:extLst>
-          </p:cNvPr>
-          <p:cNvSpPr>
-            <a:spLocks noGrp="1"/>
-          </p:cNvSpPr>
-          <p:nvPr>
-            <p:ph type="subTitle" idx="1"/>
-          </p:nvPr>
-        </p:nvSpPr>
-        <p:spPr/>
-        <p:txBody>
-          <a:bodyPr/>
-          <a:lstStyle/>
-          <a:p>
-            <a:r>
-              <a:rPr lang="en-US" dirty="0"/>
-              <a:t>Attendance word: </a:t>
-            </a:r>
-            <a:r>
-              <a:rPr lang="en-US" b="0" i="0" dirty="0" err="1">
-                <a:solidFill>
-                  <a:schemeClr val="tx1"/>
-                </a:solidFill>
-                <a:effectLst/>
-                <a:latin typeface="Slack-Lato"/>
-              </a:rPr>
-              <a:t>TopTechnologist</a:t>
-            </a:r>
-            <a:endParaRPr lang="en-US" dirty="0">
-              <a:solidFill>
-                <a:schemeClr val="tx1"/>
-              </a:solidFill>
-            </a:endParaRPr>
-          </a:p>
-        </p:txBody>
-      </p:sp>
-    </p:spTree>
-    <p:extLst>
-      <p:ext uri="{BB962C8B-B14F-4D97-AF65-F5344CB8AC3E}">
-        <p14:creationId xmlns:p14="http://schemas.microsoft.com/office/powerpoint/2010/main" val="3877287137"/>
-      </p:ext>
-    </p:extLst>
-  </p:cSld>
-  <p:clrMapOvr>
-    <a:masterClrMapping/>
-  </p:clrMapOvr>
-</p:sld>
-</file>
-
-<file path=ppt/slides/slide14.xml><?xml version="1.0" encoding="utf-8"?>
-<p:sld xmlns:a="http://schemas.openxmlformats.org/drawingml/2006/main" xmlns:r="http://schemas.openxmlformats.org/officeDocument/2006/relationships" xmlns:p="http://schemas.openxmlformats.org/presentationml/2006/main">
-  <p:cSld>
-    <p:spTree>
-      <p:nvGrpSpPr>
-        <p:cNvPr id="1" name=""/>
-        <p:cNvGrpSpPr/>
-        <p:nvPr/>
-      </p:nvGrpSpPr>
-      <p:grpSpPr>
-        <a:xfrm>
-          <a:off x="0" y="0"/>
-          <a:ext cx="0" cy="0"/>
-          <a:chOff x="0" y="0"/>
-          <a:chExt cx="0" cy="0"/>
-        </a:xfrm>
-      </p:grpSpPr>
-      <p:sp>
-        <p:nvSpPr>
-          <p:cNvPr id="4" name="Content Placeholder 3">
-            <a:extLst>
-              <a:ext uri="{FF2B5EF4-FFF2-40B4-BE49-F238E27FC236}">
-                <a16:creationId xmlns:a16="http://schemas.microsoft.com/office/drawing/2014/main" id="{23FDEBE0-2BAD-446D-96CE-F0320E3CA029}"/>
-              </a:ext>
-            </a:extLst>
-          </p:cNvPr>
-          <p:cNvSpPr>
-            <a:spLocks noGrp="1"/>
-          </p:cNvSpPr>
-          <p:nvPr>
-            <p:ph sz="half" idx="1"/>
-          </p:nvPr>
-        </p:nvSpPr>
-        <p:spPr/>
-        <p:txBody>
-          <a:bodyPr/>
-          <a:lstStyle/>
-          <a:p>
-            <a:r>
-              <a:rPr lang="en-US" dirty="0"/>
-              <a:t>A subquery is a query nested in a larger query</a:t>
-            </a:r>
-          </a:p>
-          <a:p>
-            <a:pPr lvl="1"/>
-            <a:r>
-              <a:rPr lang="en-US" dirty="0"/>
-              <a:t>In the SELECT, FROM, or WHERE clauses</a:t>
-            </a:r>
-          </a:p>
-          <a:p>
-            <a:r>
-              <a:rPr lang="en-US" dirty="0"/>
-              <a:t>The inner query executes before the parent query so the inner query result can be used in the parent query</a:t>
-            </a:r>
-          </a:p>
-          <a:p>
-            <a:r>
-              <a:rPr lang="en-US" dirty="0"/>
-              <a:t>Should rarely use in production systems BECAUSE joins are almost always more efficient. BUT:</a:t>
-            </a:r>
-          </a:p>
-          <a:p>
-            <a:pPr lvl="1"/>
-            <a:r>
-              <a:rPr lang="en-US" dirty="0"/>
-              <a:t>Not always possible to use a join</a:t>
-            </a:r>
-          </a:p>
-          <a:p>
-            <a:pPr lvl="1"/>
-            <a:r>
-              <a:rPr lang="en-US" dirty="0"/>
-              <a:t>Subqueries often used with update, insert, and delete</a:t>
-            </a:r>
-          </a:p>
-        </p:txBody>
-      </p:sp>
-      <p:sp>
-        <p:nvSpPr>
-          <p:cNvPr id="5" name="Content Placeholder 4">
-            <a:extLst>
-              <a:ext uri="{FF2B5EF4-FFF2-40B4-BE49-F238E27FC236}">
-                <a16:creationId xmlns:a16="http://schemas.microsoft.com/office/drawing/2014/main" id="{1D309249-B5A3-4522-AB7B-23CF5DED75B7}"/>
-              </a:ext>
-            </a:extLst>
-          </p:cNvPr>
-          <p:cNvSpPr>
-            <a:spLocks noGrp="1"/>
-          </p:cNvSpPr>
-          <p:nvPr>
-            <p:ph sz="half" idx="2"/>
-          </p:nvPr>
-        </p:nvSpPr>
-        <p:spPr>
-          <a:xfrm>
-            <a:off x="6187833" y="1943099"/>
-            <a:ext cx="5384800" cy="4398433"/>
-          </a:xfrm>
-        </p:spPr>
-        <p:txBody>
-          <a:bodyPr>
-            <a:normAutofit/>
-          </a:bodyPr>
-          <a:lstStyle/>
-          <a:p>
-            <a:pPr marL="0" indent="0">
-              <a:buNone/>
-            </a:pPr>
-            <a:r>
-              <a:rPr lang="en-US" b="0" i="0" dirty="0">
-                <a:effectLst/>
-                <a:latin typeface="Consolas" panose="020B0609020204030204" pitchFamily="49" charset="0"/>
-              </a:rPr>
-              <a:t>SELECT </a:t>
-            </a:r>
-            <a:r>
-              <a:rPr lang="en-US" b="0" i="1" dirty="0" err="1">
-                <a:effectLst/>
-                <a:latin typeface="Consolas" panose="020B0609020204030204" pitchFamily="49" charset="0"/>
-              </a:rPr>
-              <a:t>column_name</a:t>
-            </a:r>
-            <a:r>
-              <a:rPr lang="en-US" b="0" i="1" dirty="0">
-                <a:effectLst/>
-                <a:latin typeface="Consolas" panose="020B0609020204030204" pitchFamily="49" charset="0"/>
-              </a:rPr>
-              <a:t>(s)</a:t>
-            </a:r>
-            <a:br>
-              <a:rPr lang="en-US" dirty="0"/>
-            </a:br>
-            <a:r>
-              <a:rPr lang="en-US" b="0" i="0" dirty="0">
-                <a:effectLst/>
-                <a:latin typeface="Consolas" panose="020B0609020204030204" pitchFamily="49" charset="0"/>
-              </a:rPr>
-              <a:t>FROM </a:t>
-            </a:r>
-            <a:r>
-              <a:rPr lang="en-US" b="0" i="1" dirty="0" err="1">
-                <a:effectLst/>
-                <a:latin typeface="Consolas" panose="020B0609020204030204" pitchFamily="49" charset="0"/>
-              </a:rPr>
-              <a:t>table_name</a:t>
-            </a:r>
-            <a:br>
-              <a:rPr lang="en-US" dirty="0"/>
-            </a:br>
-            <a:r>
-              <a:rPr lang="en-US" b="0" i="0" dirty="0">
-                <a:effectLst/>
-                <a:latin typeface="Consolas" panose="020B0609020204030204" pitchFamily="49" charset="0"/>
-              </a:rPr>
-              <a:t>WHERE </a:t>
-            </a:r>
-            <a:r>
-              <a:rPr lang="en-US" b="0" i="1" dirty="0" err="1">
-                <a:effectLst/>
-                <a:latin typeface="Consolas" panose="020B0609020204030204" pitchFamily="49" charset="0"/>
-              </a:rPr>
-              <a:t>column_name</a:t>
-            </a:r>
-            <a:r>
-              <a:rPr lang="en-US" b="0" i="1" dirty="0">
-                <a:effectLst/>
-                <a:latin typeface="Consolas" panose="020B0609020204030204" pitchFamily="49" charset="0"/>
-              </a:rPr>
-              <a:t> operator</a:t>
-            </a:r>
-            <a:r>
-              <a:rPr lang="en-US" b="0" i="0" dirty="0">
-                <a:effectLst/>
-                <a:latin typeface="Consolas" panose="020B0609020204030204" pitchFamily="49" charset="0"/>
-              </a:rPr>
-              <a:t> ANY/ALL</a:t>
-            </a:r>
-            <a:br>
-              <a:rPr lang="en-US" dirty="0"/>
-            </a:br>
-            <a:r>
-              <a:rPr lang="en-US" b="0" i="0" dirty="0">
-                <a:effectLst/>
-                <a:latin typeface="Consolas" panose="020B0609020204030204" pitchFamily="49" charset="0"/>
-              </a:rPr>
-              <a:t>(SELECT </a:t>
-            </a:r>
-            <a:r>
-              <a:rPr lang="en-US" b="0" i="1" dirty="0" err="1">
-                <a:effectLst/>
-                <a:latin typeface="Consolas" panose="020B0609020204030204" pitchFamily="49" charset="0"/>
-              </a:rPr>
-              <a:t>column_name</a:t>
-            </a:r>
-            <a:r>
-              <a:rPr lang="en-US" b="0" i="1" dirty="0">
-                <a:effectLst/>
-                <a:latin typeface="Consolas" panose="020B0609020204030204" pitchFamily="49" charset="0"/>
-              </a:rPr>
-              <a:t> </a:t>
-            </a:r>
-            <a:r>
-              <a:rPr lang="en-US" b="0" i="0" dirty="0">
-                <a:effectLst/>
-                <a:latin typeface="Consolas" panose="020B0609020204030204" pitchFamily="49" charset="0"/>
-              </a:rPr>
-              <a:t>FROM </a:t>
-            </a:r>
-            <a:r>
-              <a:rPr lang="en-US" b="0" i="1" dirty="0" err="1">
-                <a:effectLst/>
-                <a:latin typeface="Consolas" panose="020B0609020204030204" pitchFamily="49" charset="0"/>
-              </a:rPr>
-              <a:t>table_name</a:t>
-            </a:r>
-            <a:r>
-              <a:rPr lang="en-US" b="0" i="0" dirty="0">
-                <a:effectLst/>
-                <a:latin typeface="Consolas" panose="020B0609020204030204" pitchFamily="49" charset="0"/>
-              </a:rPr>
-              <a:t> </a:t>
-            </a:r>
-          </a:p>
-          <a:p>
-            <a:pPr marL="0" indent="0">
-              <a:buNone/>
-            </a:pPr>
-            <a:r>
-              <a:rPr lang="en-US" b="0" i="0" dirty="0">
-                <a:effectLst/>
-                <a:latin typeface="Consolas" panose="020B0609020204030204" pitchFamily="49" charset="0"/>
-              </a:rPr>
-              <a:t>WHERE </a:t>
-            </a:r>
-            <a:r>
-              <a:rPr lang="en-US" b="0" i="1" dirty="0">
-                <a:effectLst/>
-                <a:latin typeface="Consolas" panose="020B0609020204030204" pitchFamily="49" charset="0"/>
-              </a:rPr>
-              <a:t>condition</a:t>
-            </a:r>
-            <a:r>
-              <a:rPr lang="en-US" b="0" i="0" dirty="0">
-                <a:effectLst/>
-                <a:latin typeface="Consolas" panose="020B0609020204030204" pitchFamily="49" charset="0"/>
-              </a:rPr>
-              <a:t>);</a:t>
-            </a:r>
-            <a:r>
-              <a:rPr lang="en-US" b="0" i="1" dirty="0">
-                <a:solidFill>
-                  <a:srgbClr val="000000"/>
-                </a:solidFill>
-                <a:effectLst/>
-                <a:latin typeface="Consolas" panose="020B0609020204030204" pitchFamily="49" charset="0"/>
-              </a:rPr>
-              <a:t>or subquery);</a:t>
-            </a:r>
-            <a:endParaRPr lang="en-US" b="0" i="0" dirty="0">
-              <a:solidFill>
-                <a:srgbClr val="5F6364"/>
-              </a:solidFill>
-              <a:effectLst/>
-              <a:latin typeface="Consolas" panose="020B0609020204030204" pitchFamily="49" charset="0"/>
-            </a:endParaRPr>
-          </a:p>
-        </p:txBody>
-      </p:sp>
-      <p:sp>
-        <p:nvSpPr>
-          <p:cNvPr id="2" name="Title 1">
-            <a:extLst>
-              <a:ext uri="{FF2B5EF4-FFF2-40B4-BE49-F238E27FC236}">
-                <a16:creationId xmlns:a16="http://schemas.microsoft.com/office/drawing/2014/main" id="{051E2BC6-637F-4EC8-83D4-311D67F7CC00}"/>
-              </a:ext>
-            </a:extLst>
-          </p:cNvPr>
-          <p:cNvSpPr>
-            <a:spLocks noGrp="1"/>
-          </p:cNvSpPr>
-          <p:nvPr>
-            <p:ph type="title" idx="4294967295"/>
-          </p:nvPr>
-        </p:nvSpPr>
-        <p:spPr>
-          <a:xfrm>
-            <a:off x="197708" y="-164042"/>
-            <a:ext cx="10983913" cy="968375"/>
-          </a:xfrm>
-        </p:spPr>
-        <p:txBody>
-          <a:bodyPr/>
-          <a:lstStyle/>
-          <a:p>
-            <a:r>
-              <a:rPr lang="en-US" dirty="0"/>
-              <a:t>Subqueries</a:t>
-            </a:r>
-          </a:p>
-        </p:txBody>
-      </p:sp>
-    </p:spTree>
-    <p:extLst>
-      <p:ext uri="{BB962C8B-B14F-4D97-AF65-F5344CB8AC3E}">
-        <p14:creationId xmlns:p14="http://schemas.microsoft.com/office/powerpoint/2010/main" val="3960014178"/>
-      </p:ext>
-    </p:extLst>
-  </p:cSld>
-  <p:clrMapOvr>
-    <a:masterClrMapping/>
-  </p:clrMapOvr>
-</p:sld>
-</file>
-
-<file path=ppt/slides/slide15.xml><?xml version="1.0" encoding="utf-8"?>
-<p:sld xmlns:a="http://schemas.openxmlformats.org/drawingml/2006/main" xmlns:r="http://schemas.openxmlformats.org/officeDocument/2006/relationships" xmlns:p="http://schemas.openxmlformats.org/presentationml/2006/main">
-  <p:cSld>
-    <p:spTree>
-      <p:nvGrpSpPr>
-        <p:cNvPr id="1" name=""/>
-        <p:cNvGrpSpPr/>
-        <p:nvPr/>
-      </p:nvGrpSpPr>
-      <p:grpSpPr>
-        <a:xfrm>
-          <a:off x="0" y="0"/>
-          <a:ext cx="0" cy="0"/>
-          <a:chOff x="0" y="0"/>
-          <a:chExt cx="0" cy="0"/>
-        </a:xfrm>
-      </p:grpSpPr>
-      <p:sp>
-        <p:nvSpPr>
-          <p:cNvPr id="2" name="Title 1">
-            <a:extLst>
-              <a:ext uri="{FF2B5EF4-FFF2-40B4-BE49-F238E27FC236}">
-                <a16:creationId xmlns:a16="http://schemas.microsoft.com/office/drawing/2014/main" id="{3C0769D1-2A7E-4776-A1CD-069DCC49399D}"/>
-              </a:ext>
-            </a:extLst>
-          </p:cNvPr>
-          <p:cNvSpPr>
-            <a:spLocks noGrp="1"/>
-          </p:cNvSpPr>
-          <p:nvPr>
-            <p:ph type="title"/>
-          </p:nvPr>
-        </p:nvSpPr>
-        <p:spPr/>
-        <p:txBody>
-          <a:bodyPr/>
-          <a:lstStyle/>
-          <a:p>
-            <a:r>
-              <a:rPr lang="en-US" dirty="0"/>
-              <a:t>Practice (10 mins)</a:t>
-            </a:r>
-          </a:p>
-        </p:txBody>
-      </p:sp>
-      <p:sp>
-        <p:nvSpPr>
-          <p:cNvPr id="3" name="Content Placeholder 2">
-            <a:extLst>
-              <a:ext uri="{FF2B5EF4-FFF2-40B4-BE49-F238E27FC236}">
-                <a16:creationId xmlns:a16="http://schemas.microsoft.com/office/drawing/2014/main" id="{A69EE79D-BB8E-47F4-AFE6-0600BC320496}"/>
-              </a:ext>
-            </a:extLst>
-          </p:cNvPr>
-          <p:cNvSpPr>
-            <a:spLocks noGrp="1"/>
-          </p:cNvSpPr>
-          <p:nvPr>
-            <p:ph idx="1"/>
-          </p:nvPr>
-        </p:nvSpPr>
-        <p:spPr/>
-        <p:txBody>
-          <a:bodyPr/>
-          <a:lstStyle/>
-          <a:p>
-            <a:r>
-              <a:rPr lang="en-US" dirty="0"/>
-              <a:t>Write a subquery that finds the </a:t>
-            </a:r>
-            <a:r>
-              <a:rPr lang="en-US" dirty="0" err="1"/>
-              <a:t>film_id</a:t>
-            </a:r>
-            <a:r>
-              <a:rPr lang="en-US" dirty="0"/>
-              <a:t>, title, and </a:t>
-            </a:r>
-            <a:r>
-              <a:rPr lang="en-US" dirty="0" err="1"/>
-              <a:t>replacement_cost</a:t>
-            </a:r>
-            <a:r>
-              <a:rPr lang="en-US" dirty="0"/>
-              <a:t> for reach film where the </a:t>
-            </a:r>
-            <a:r>
-              <a:rPr lang="en-US" dirty="0" err="1"/>
-              <a:t>replacement_cost</a:t>
-            </a:r>
-            <a:r>
-              <a:rPr lang="en-US" dirty="0"/>
-              <a:t> is greater than the average. </a:t>
-            </a:r>
-          </a:p>
-          <a:p>
-            <a:endParaRPr lang="en-US" dirty="0"/>
-          </a:p>
-          <a:p>
-            <a:r>
-              <a:rPr lang="en-US" dirty="0"/>
-              <a:t>Write a query that shows all active customers and the countries they live in ordered by state from A-Z. </a:t>
-            </a:r>
-          </a:p>
-        </p:txBody>
-      </p:sp>
-    </p:spTree>
-    <p:extLst>
-      <p:ext uri="{BB962C8B-B14F-4D97-AF65-F5344CB8AC3E}">
-        <p14:creationId xmlns:p14="http://schemas.microsoft.com/office/powerpoint/2010/main" val="1658532722"/>
-      </p:ext>
-    </p:extLst>
-  </p:cSld>
-  <p:clrMapOvr>
-    <a:masterClrMapping/>
-  </p:clrMapOvr>
-</p:sld>
-</file>
-
-<file path=ppt/slides/slide16.xml><?xml version="1.0" encoding="utf-8"?>
-<p:sld xmlns:a="http://schemas.openxmlformats.org/drawingml/2006/main" xmlns:r="http://schemas.openxmlformats.org/officeDocument/2006/relationships" xmlns:p="http://schemas.openxmlformats.org/presentationml/2006/main">
-  <p:cSld>
-    <p:spTree>
-      <p:nvGrpSpPr>
-        <p:cNvPr id="1" name=""/>
-        <p:cNvGrpSpPr/>
-        <p:nvPr/>
-      </p:nvGrpSpPr>
-      <p:grpSpPr>
-        <a:xfrm>
-          <a:off x="0" y="0"/>
-          <a:ext cx="0" cy="0"/>
-          <a:chOff x="0" y="0"/>
-          <a:chExt cx="0" cy="0"/>
-        </a:xfrm>
-      </p:grpSpPr>
-      <p:sp>
-        <p:nvSpPr>
-          <p:cNvPr id="2" name="Title 1">
-            <a:extLst>
-              <a:ext uri="{FF2B5EF4-FFF2-40B4-BE49-F238E27FC236}">
-                <a16:creationId xmlns:a16="http://schemas.microsoft.com/office/drawing/2014/main" id="{1E4C2A9E-C0F4-4E0F-AFFE-27A0CF3625B5}"/>
-              </a:ext>
-            </a:extLst>
-          </p:cNvPr>
-          <p:cNvSpPr>
-            <a:spLocks noGrp="1"/>
-          </p:cNvSpPr>
-          <p:nvPr>
-            <p:ph type="title"/>
-          </p:nvPr>
-        </p:nvSpPr>
-        <p:spPr/>
-        <p:txBody>
-          <a:bodyPr/>
-          <a:lstStyle/>
-          <a:p>
-            <a:r>
-              <a:rPr lang="en-US"/>
-              <a:t>Week 7 </a:t>
-            </a:r>
-            <a:r>
-              <a:rPr lang="en-US" dirty="0"/>
-              <a:t>Group Exercise</a:t>
-            </a:r>
-          </a:p>
-        </p:txBody>
-      </p:sp>
-      <p:sp>
-        <p:nvSpPr>
-          <p:cNvPr id="3" name="Content Placeholder 2">
-            <a:extLst>
-              <a:ext uri="{FF2B5EF4-FFF2-40B4-BE49-F238E27FC236}">
-                <a16:creationId xmlns:a16="http://schemas.microsoft.com/office/drawing/2014/main" id="{D327E97E-AE1B-400B-A18F-C9C7C854DCEB}"/>
-              </a:ext>
-            </a:extLst>
-          </p:cNvPr>
-          <p:cNvSpPr>
-            <a:spLocks noGrp="1"/>
-          </p:cNvSpPr>
-          <p:nvPr>
-            <p:ph idx="1"/>
-          </p:nvPr>
-        </p:nvSpPr>
-        <p:spPr/>
-        <p:txBody>
-          <a:bodyPr vert="horz" lIns="91440" tIns="45720" rIns="91440" bIns="45720" rtlCol="0" anchor="t">
-            <a:normAutofit/>
-          </a:bodyPr>
-          <a:lstStyle/>
-          <a:p>
-            <a:r>
-              <a:rPr lang="en-US" spc="0" dirty="0"/>
-              <a:t>Once you finish and have submitted your exercise properly, please feel free to go back to any previous </a:t>
-            </a:r>
-            <a:r>
-              <a:rPr lang="en-US" spc="0" dirty="0" err="1"/>
-              <a:t>homeworks</a:t>
-            </a:r>
-            <a:r>
-              <a:rPr lang="en-US" spc="0" dirty="0"/>
-              <a:t> and ask questions you have about them OR start working on next week’s assignment!</a:t>
-            </a:r>
-          </a:p>
-        </p:txBody>
-      </p:sp>
-    </p:spTree>
-    <p:extLst>
-      <p:ext uri="{BB962C8B-B14F-4D97-AF65-F5344CB8AC3E}">
-        <p14:creationId xmlns:p14="http://schemas.microsoft.com/office/powerpoint/2010/main" val="656484464"/>
-      </p:ext>
-    </p:extLst>
-  </p:cSld>
-  <p:clrMapOvr>
-    <a:masterClrMapping/>
-  </p:clrMapOvr>
-</p:sld>
-</file>
-
-<file path=ppt/slides/slide2.xml><?xml version="1.0" encoding="utf-8"?>
-<p:sld xmlns:a="http://schemas.openxmlformats.org/drawingml/2006/main" xmlns:r="http://schemas.openxmlformats.org/officeDocument/2006/relationships" xmlns:p="http://schemas.openxmlformats.org/presentationml/2006/main">
-  <p:cSld>
-    <p:spTree>
-      <p:nvGrpSpPr>
-        <p:cNvPr id="1" name=""/>
-        <p:cNvGrpSpPr/>
-        <p:nvPr/>
-      </p:nvGrpSpPr>
-      <p:grpSpPr>
-        <a:xfrm>
-          <a:off x="0" y="0"/>
-          <a:ext cx="0" cy="0"/>
-          <a:chOff x="0" y="0"/>
-          <a:chExt cx="0" cy="0"/>
-        </a:xfrm>
-      </p:grpSpPr>
-      <p:sp>
-        <p:nvSpPr>
-          <p:cNvPr id="2" name="Title 1">
-            <a:extLst>
-              <a:ext uri="{FF2B5EF4-FFF2-40B4-BE49-F238E27FC236}">
-                <a16:creationId xmlns:a16="http://schemas.microsoft.com/office/drawing/2014/main" id="{05D6C5DD-629A-487F-A7F5-924593CD7E48}"/>
-              </a:ext>
-            </a:extLst>
-          </p:cNvPr>
-          <p:cNvSpPr>
-            <a:spLocks noGrp="1"/>
-          </p:cNvSpPr>
-          <p:nvPr>
-            <p:ph type="title"/>
-          </p:nvPr>
-        </p:nvSpPr>
-        <p:spPr/>
-        <p:txBody>
-          <a:bodyPr/>
-          <a:lstStyle/>
-          <a:p>
-            <a:r>
-              <a:rPr lang="en-US" dirty="0"/>
-              <a:t>Warm-up	(10 minutes)</a:t>
-            </a:r>
-          </a:p>
-        </p:txBody>
-      </p:sp>
-      <p:sp>
-        <p:nvSpPr>
-          <p:cNvPr id="3" name="Content Placeholder 2">
-            <a:extLst>
-              <a:ext uri="{FF2B5EF4-FFF2-40B4-BE49-F238E27FC236}">
-                <a16:creationId xmlns:a16="http://schemas.microsoft.com/office/drawing/2014/main" id="{25D9BA3D-E1A8-448E-8CE9-5E85A7B8C4E1}"/>
-              </a:ext>
-            </a:extLst>
-          </p:cNvPr>
-          <p:cNvSpPr>
-            <a:spLocks noGrp="1"/>
-          </p:cNvSpPr>
-          <p:nvPr>
-            <p:ph idx="1"/>
-          </p:nvPr>
-        </p:nvSpPr>
-        <p:spPr>
-          <a:xfrm>
-            <a:off x="1261872" y="1717130"/>
-            <a:ext cx="8595360" cy="4351337"/>
-          </a:xfrm>
-        </p:spPr>
-        <p:txBody>
-          <a:bodyPr/>
-          <a:lstStyle/>
-          <a:p>
-            <a:r>
-              <a:rPr lang="en-US" dirty="0"/>
-              <a:t>What does ACID stand for and why is it so important for databases?</a:t>
-            </a:r>
-          </a:p>
-          <a:p>
-            <a:endParaRPr lang="en-US" dirty="0"/>
-          </a:p>
-          <a:p>
-            <a:endParaRPr lang="en-US" dirty="0"/>
-          </a:p>
-          <a:p>
-            <a:endParaRPr lang="en-US" dirty="0"/>
-          </a:p>
-          <a:p>
-            <a:endParaRPr lang="en-US" dirty="0"/>
-          </a:p>
-          <a:p>
-            <a:r>
-              <a:rPr lang="en-US" dirty="0"/>
-              <a:t>Create a table in the default </a:t>
-            </a:r>
-            <a:r>
-              <a:rPr lang="en-US" dirty="0" err="1"/>
-              <a:t>postgres</a:t>
-            </a:r>
-            <a:r>
-              <a:rPr lang="en-US" dirty="0"/>
-              <a:t> database (called “</a:t>
-            </a:r>
-            <a:r>
-              <a:rPr lang="en-US" dirty="0" err="1"/>
-              <a:t>postgres</a:t>
-            </a:r>
-            <a:r>
-              <a:rPr lang="en-US" dirty="0"/>
-              <a:t>”) called either “cats” or “dogs”. Include at least three columns in your create statement. Use </a:t>
-            </a:r>
-            <a:r>
-              <a:rPr lang="en-US" dirty="0">
-                <a:hlinkClick r:id="rId2"/>
-              </a:rPr>
-              <a:t>https://www.postgresql.org/docs/9.1/sql-createtable.html</a:t>
-            </a:r>
-            <a:r>
-              <a:rPr lang="en-US" dirty="0"/>
-              <a:t> to help you</a:t>
-            </a:r>
-          </a:p>
-        </p:txBody>
-      </p:sp>
-    </p:spTree>
-    <p:extLst>
-      <p:ext uri="{BB962C8B-B14F-4D97-AF65-F5344CB8AC3E}">
-        <p14:creationId xmlns:p14="http://schemas.microsoft.com/office/powerpoint/2010/main" val="188562136"/>
-      </p:ext>
-    </p:extLst>
-  </p:cSld>
-  <p:clrMapOvr>
-    <a:masterClrMapping/>
-  </p:clrMapOvr>
-</p:sld>
-</file>
-
-<file path=ppt/slides/slide3.xml><?xml version="1.0" encoding="utf-8"?>
-<p:sld xmlns:a="http://schemas.openxmlformats.org/drawingml/2006/main" xmlns:r="http://schemas.openxmlformats.org/officeDocument/2006/relationships" xmlns:p="http://schemas.openxmlformats.org/presentationml/2006/main">
-  <p:cSld>
-    <p:spTree>
-      <p:nvGrpSpPr>
-        <p:cNvPr id="1" name=""/>
-        <p:cNvGrpSpPr/>
-        <p:nvPr/>
-      </p:nvGrpSpPr>
-      <p:grpSpPr>
-        <a:xfrm>
-          <a:off x="0" y="0"/>
-          <a:ext cx="0" cy="0"/>
-          <a:chOff x="0" y="0"/>
-          <a:chExt cx="0" cy="0"/>
-        </a:xfrm>
-      </p:grpSpPr>
-      <p:sp>
-        <p:nvSpPr>
-          <p:cNvPr id="2" name="Title 1">
-            <a:extLst>
-              <a:ext uri="{FF2B5EF4-FFF2-40B4-BE49-F238E27FC236}">
-                <a16:creationId xmlns:a16="http://schemas.microsoft.com/office/drawing/2014/main" id="{4B6EB97C-9C9E-4774-B618-710FC677AD19}"/>
-              </a:ext>
-            </a:extLst>
-          </p:cNvPr>
-          <p:cNvSpPr>
-            <a:spLocks noGrp="1"/>
-          </p:cNvSpPr>
-          <p:nvPr>
-            <p:ph type="title"/>
-          </p:nvPr>
-        </p:nvSpPr>
-        <p:spPr>
-          <a:xfrm>
-            <a:off x="80344" y="40412"/>
-            <a:ext cx="9692640" cy="769046"/>
-          </a:xfrm>
-        </p:spPr>
-        <p:txBody>
-          <a:bodyPr/>
-          <a:lstStyle/>
-          <a:p>
-            <a:r>
-              <a:rPr lang="en-US" dirty="0"/>
-              <a:t>Today's Activities</a:t>
-            </a:r>
-          </a:p>
-        </p:txBody>
-      </p:sp>
-      <p:sp>
-        <p:nvSpPr>
-          <p:cNvPr id="3" name="Content Placeholder 2">
-            <a:extLst>
-              <a:ext uri="{FF2B5EF4-FFF2-40B4-BE49-F238E27FC236}">
-                <a16:creationId xmlns:a16="http://schemas.microsoft.com/office/drawing/2014/main" id="{A94ED92E-9B1F-48CA-A2B2-FF65221C2F5D}"/>
-              </a:ext>
-            </a:extLst>
-          </p:cNvPr>
-          <p:cNvSpPr>
-            <a:spLocks noGrp="1"/>
-          </p:cNvSpPr>
-          <p:nvPr>
-            <p:ph idx="1"/>
-          </p:nvPr>
-        </p:nvSpPr>
-        <p:spPr>
-          <a:xfrm>
-            <a:off x="696793" y="981182"/>
-            <a:ext cx="9400168" cy="5507179"/>
-          </a:xfrm>
-        </p:spPr>
-        <p:txBody>
-          <a:bodyPr vert="horz" lIns="91440" tIns="45720" rIns="91440" bIns="45720" rtlCol="0" anchor="t">
-            <a:normAutofit/>
-          </a:bodyPr>
-          <a:lstStyle/>
-          <a:p>
-            <a:r>
-              <a:rPr lang="en-US" dirty="0"/>
-              <a:t>Warmup (15 mins)</a:t>
-            </a:r>
-          </a:p>
-          <a:p>
-            <a:r>
-              <a:rPr lang="en-US" dirty="0"/>
-              <a:t>Homework Answers/Q&amp;A (25 mins)</a:t>
-            </a:r>
-          </a:p>
-          <a:p>
-            <a:r>
-              <a:rPr lang="en-US" dirty="0"/>
-              <a:t>Data Modeling Basics (50 mins)</a:t>
-            </a:r>
-          </a:p>
-          <a:p>
-            <a:r>
-              <a:rPr lang="en-US" dirty="0"/>
-              <a:t>Break (15 mins)</a:t>
-            </a:r>
-          </a:p>
-          <a:p>
-            <a:r>
-              <a:rPr lang="en-US" dirty="0"/>
-              <a:t>Subqueries and Joins (30 mins)</a:t>
-            </a:r>
-          </a:p>
-          <a:p>
-            <a:r>
-              <a:rPr lang="en-US" dirty="0"/>
-              <a:t>Group Exercise (45 mins)</a:t>
-            </a:r>
-          </a:p>
-          <a:p>
-            <a:endParaRPr lang="en-US" dirty="0"/>
-          </a:p>
-        </p:txBody>
-      </p:sp>
-    </p:spTree>
-    <p:extLst>
-      <p:ext uri="{BB962C8B-B14F-4D97-AF65-F5344CB8AC3E}">
-        <p14:creationId xmlns:p14="http://schemas.microsoft.com/office/powerpoint/2010/main" val="2975521112"/>
-      </p:ext>
-    </p:extLst>
-  </p:cSld>
-  <p:clrMapOvr>
-    <a:masterClrMapping/>
-  </p:clrMapOvr>
-</p:sld>
-</file>
-
-<file path=ppt/slides/slide4.xml><?xml version="1.0" encoding="utf-8"?>
-<p:sld xmlns:a="http://schemas.openxmlformats.org/drawingml/2006/main" xmlns:r="http://schemas.openxmlformats.org/officeDocument/2006/relationships" xmlns:p="http://schemas.openxmlformats.org/presentationml/2006/main">
-  <p:cSld>
-    <p:spTree>
-      <p:nvGrpSpPr>
-        <p:cNvPr id="1" name=""/>
-        <p:cNvGrpSpPr/>
-        <p:nvPr/>
-      </p:nvGrpSpPr>
-      <p:grpSpPr>
-        <a:xfrm>
-          <a:off x="0" y="0"/>
-          <a:ext cx="0" cy="0"/>
-          <a:chOff x="0" y="0"/>
-          <a:chExt cx="0" cy="0"/>
-        </a:xfrm>
-      </p:grpSpPr>
-      <p:sp>
-        <p:nvSpPr>
-          <p:cNvPr id="2" name="Title 1">
-            <a:extLst>
-              <a:ext uri="{FF2B5EF4-FFF2-40B4-BE49-F238E27FC236}">
-                <a16:creationId xmlns:a16="http://schemas.microsoft.com/office/drawing/2014/main" id="{F6B7C306-19F1-4155-8560-64A0628655D7}"/>
-              </a:ext>
-            </a:extLst>
-          </p:cNvPr>
-          <p:cNvSpPr>
-            <a:spLocks noGrp="1"/>
-          </p:cNvSpPr>
-          <p:nvPr>
-            <p:ph type="title"/>
-          </p:nvPr>
-        </p:nvSpPr>
-        <p:spPr/>
-        <p:txBody>
-          <a:bodyPr/>
-          <a:lstStyle/>
-          <a:p>
-            <a:r>
-              <a:rPr lang="en-US" dirty="0"/>
-              <a:t>Class Reminders</a:t>
-            </a:r>
-          </a:p>
-        </p:txBody>
-      </p:sp>
-      <p:sp>
-        <p:nvSpPr>
-          <p:cNvPr id="3" name="Content Placeholder 2">
-            <a:extLst>
-              <a:ext uri="{FF2B5EF4-FFF2-40B4-BE49-F238E27FC236}">
-                <a16:creationId xmlns:a16="http://schemas.microsoft.com/office/drawing/2014/main" id="{7D5E422A-199A-4808-BFA5-2D9C37C0F89B}"/>
-              </a:ext>
-            </a:extLst>
-          </p:cNvPr>
-          <p:cNvSpPr>
-            <a:spLocks noGrp="1"/>
-          </p:cNvSpPr>
-          <p:nvPr>
-            <p:ph idx="1"/>
-          </p:nvPr>
-        </p:nvSpPr>
-        <p:spPr/>
-        <p:txBody>
-          <a:bodyPr/>
-          <a:lstStyle/>
-          <a:p>
-            <a:r>
-              <a:rPr lang="en-US" dirty="0"/>
-              <a:t>At each checkpoint, your in-class assignments grade needs to average &gt;= 70%</a:t>
-            </a:r>
-          </a:p>
-          <a:p>
-            <a:r>
-              <a:rPr lang="en-US" dirty="0"/>
-              <a:t>I will not be grading in-class assignments that are more than a week late.</a:t>
-            </a:r>
-          </a:p>
-          <a:p>
-            <a:r>
-              <a:rPr lang="en-US" dirty="0"/>
-              <a:t>You will now lose points if assignments are more than 2 days late. This starts with the week 6 </a:t>
-            </a:r>
-            <a:r>
-              <a:rPr lang="en-US"/>
-              <a:t>SQL homework. </a:t>
-            </a:r>
-            <a:endParaRPr lang="en-US" dirty="0"/>
-          </a:p>
-          <a:p>
-            <a:r>
-              <a:rPr lang="en-US" dirty="0"/>
-              <a:t>You are only allowed to miss one assignment in the whole course, so choose wisely. </a:t>
-            </a:r>
-          </a:p>
-          <a:p>
-            <a:endParaRPr lang="en-US" dirty="0"/>
-          </a:p>
-        </p:txBody>
-      </p:sp>
-    </p:spTree>
-    <p:extLst>
-      <p:ext uri="{BB962C8B-B14F-4D97-AF65-F5344CB8AC3E}">
-        <p14:creationId xmlns:p14="http://schemas.microsoft.com/office/powerpoint/2010/main" val="3501738748"/>
-      </p:ext>
-    </p:extLst>
-  </p:cSld>
-  <p:clrMapOvr>
-    <a:masterClrMapping/>
-  </p:clrMapOvr>
-</p:sld>
-</file>
-
-<file path=ppt/slides/slide5.xml><?xml version="1.0" encoding="utf-8"?>
-<p:sld xmlns:a="http://schemas.openxmlformats.org/drawingml/2006/main" xmlns:r="http://schemas.openxmlformats.org/officeDocument/2006/relationships" xmlns:p="http://schemas.openxmlformats.org/presentationml/2006/main">
-  <p:cSld>
-    <p:spTree>
-      <p:nvGrpSpPr>
-        <p:cNvPr id="1" name=""/>
-        <p:cNvGrpSpPr/>
-        <p:nvPr/>
-      </p:nvGrpSpPr>
-      <p:grpSpPr>
-        <a:xfrm>
-          <a:off x="0" y="0"/>
-          <a:ext cx="0" cy="0"/>
-          <a:chOff x="0" y="0"/>
-          <a:chExt cx="0" cy="0"/>
-        </a:xfrm>
-      </p:grpSpPr>
-      <p:sp>
-        <p:nvSpPr>
-          <p:cNvPr id="2" name="Title 1">
-            <a:extLst>
-              <a:ext uri="{FF2B5EF4-FFF2-40B4-BE49-F238E27FC236}">
-                <a16:creationId xmlns:a16="http://schemas.microsoft.com/office/drawing/2014/main" id="{BE3D1A1B-D13D-4D77-8B55-4A6A706538CD}"/>
-              </a:ext>
-            </a:extLst>
-          </p:cNvPr>
-          <p:cNvSpPr>
-            <a:spLocks noGrp="1"/>
-          </p:cNvSpPr>
-          <p:nvPr>
-            <p:ph type="title"/>
-          </p:nvPr>
-        </p:nvSpPr>
-        <p:spPr>
-          <a:xfrm>
-            <a:off x="953647" y="-550352"/>
-            <a:ext cx="9692640" cy="1325562"/>
-          </a:xfrm>
-        </p:spPr>
-        <p:txBody>
-          <a:bodyPr/>
-          <a:lstStyle/>
-          <a:p>
-            <a:r>
-              <a:rPr lang="en-US" dirty="0"/>
-              <a:t>Homework Answers (25 mins)</a:t>
-            </a:r>
-          </a:p>
-        </p:txBody>
-      </p:sp>
-      <p:sp>
-        <p:nvSpPr>
-          <p:cNvPr id="3" name="Content Placeholder 2">
-            <a:extLst>
-              <a:ext uri="{FF2B5EF4-FFF2-40B4-BE49-F238E27FC236}">
-                <a16:creationId xmlns:a16="http://schemas.microsoft.com/office/drawing/2014/main" id="{1C31657E-A052-466D-9218-FD671392B5A7}"/>
-              </a:ext>
-            </a:extLst>
-          </p:cNvPr>
-          <p:cNvSpPr>
-            <a:spLocks noGrp="1"/>
-          </p:cNvSpPr>
-          <p:nvPr>
-            <p:ph idx="1"/>
-          </p:nvPr>
-        </p:nvSpPr>
-        <p:spPr>
-          <a:xfrm>
-            <a:off x="1210501" y="1503452"/>
-            <a:ext cx="8595360" cy="4351337"/>
-          </a:xfrm>
-        </p:spPr>
-        <p:txBody>
-          <a:bodyPr vert="horz" lIns="91440" tIns="45720" rIns="91440" bIns="45720" rtlCol="0" anchor="t">
-            <a:normAutofit/>
-          </a:bodyPr>
-          <a:lstStyle/>
-          <a:p>
-            <a:r>
-              <a:rPr lang="en-US" dirty="0"/>
-              <a:t>To save some time I will discuss a subset of answers.</a:t>
-            </a:r>
-          </a:p>
-          <a:p>
-            <a:r>
-              <a:rPr lang="en-US" dirty="0"/>
-              <a:t>Voluntarily slack answers to the #datascience channel</a:t>
-            </a:r>
-          </a:p>
-          <a:p>
-            <a:r>
-              <a:rPr lang="en-US" dirty="0"/>
-              <a:t>Don't be shy!</a:t>
-            </a:r>
-          </a:p>
-        </p:txBody>
-      </p:sp>
-    </p:spTree>
-    <p:extLst>
-      <p:ext uri="{BB962C8B-B14F-4D97-AF65-F5344CB8AC3E}">
-        <p14:creationId xmlns:p14="http://schemas.microsoft.com/office/powerpoint/2010/main" val="2679292092"/>
-      </p:ext>
-    </p:extLst>
-  </p:cSld>
-  <p:clrMapOvr>
-    <a:masterClrMapping/>
-  </p:clrMapOvr>
-</p:sld>
-</file>
-
-<file path=ppt/slides/slide6.xml><?xml version="1.0" encoding="utf-8"?>
-<p:sld xmlns:a="http://schemas.openxmlformats.org/drawingml/2006/main" xmlns:r="http://schemas.openxmlformats.org/officeDocument/2006/relationships" xmlns:p="http://schemas.openxmlformats.org/presentationml/2006/main">
-  <p:cSld>
-    <p:spTree>
-      <p:nvGrpSpPr>
-        <p:cNvPr id="1" name=""/>
-        <p:cNvGrpSpPr/>
-        <p:nvPr/>
-      </p:nvGrpSpPr>
-      <p:grpSpPr>
-        <a:xfrm>
-          <a:off x="0" y="0"/>
-          <a:ext cx="0" cy="0"/>
-          <a:chOff x="0" y="0"/>
-          <a:chExt cx="0" cy="0"/>
-        </a:xfrm>
-      </p:grpSpPr>
-      <p:pic>
-        <p:nvPicPr>
-          <p:cNvPr id="5" name="Content Placeholder 4" descr="Diagram&#10;&#10;Description automatically generated">
-            <a:extLst>
-              <a:ext uri="{FF2B5EF4-FFF2-40B4-BE49-F238E27FC236}">
-                <a16:creationId xmlns:a16="http://schemas.microsoft.com/office/drawing/2014/main" id="{30151D0C-AB65-48B6-AD1F-C1F2EA803AA7}"/>
-              </a:ext>
-            </a:extLst>
-          </p:cNvPr>
-          <p:cNvPicPr>
-            <a:picLocks noGrp="1" noChangeAspect="1"/>
-          </p:cNvPicPr>
-          <p:nvPr>
-            <p:ph idx="1"/>
-          </p:nvPr>
-        </p:nvPicPr>
-        <p:blipFill>
-          <a:blip r:embed="rId2">
-            <a:extLst>
-              <a:ext uri="{28A0092B-C50C-407E-A947-70E740481C1C}">
-                <a14:useLocalDpi xmlns:a14="http://schemas.microsoft.com/office/drawing/2010/main" val="0"/>
-              </a:ext>
-            </a:extLst>
-          </a:blip>
-          <a:stretch>
-            <a:fillRect/>
-          </a:stretch>
-        </p:blipFill>
-        <p:spPr>
-          <a:xfrm>
-            <a:off x="1531089" y="108031"/>
-            <a:ext cx="8442251" cy="6641937"/>
-          </a:xfrm>
-        </p:spPr>
-      </p:pic>
-    </p:spTree>
-    <p:extLst>
-      <p:ext uri="{BB962C8B-B14F-4D97-AF65-F5344CB8AC3E}">
-        <p14:creationId xmlns:p14="http://schemas.microsoft.com/office/powerpoint/2010/main" val="1836824519"/>
-      </p:ext>
-    </p:extLst>
-  </p:cSld>
-  <p:clrMapOvr>
-    <a:masterClrMapping/>
-  </p:clrMapOvr>
-</p:sld>
-</file>
-
-<file path=ppt/slides/slide7.xml><?xml version="1.0" encoding="utf-8"?>
-<p:sld xmlns:a="http://schemas.openxmlformats.org/drawingml/2006/main" xmlns:r="http://schemas.openxmlformats.org/officeDocument/2006/relationships" xmlns:p="http://schemas.openxmlformats.org/presentationml/2006/main">
-  <p:cSld>
-    <p:bg>
-      <p:bgPr>
-        <a:gradFill rotWithShape="1">
-          <a:gsLst>
-            <a:gs pos="0">
-              <a:schemeClr val="bg1">
-                <a:tint val="94000"/>
-                <a:shade val="98000"/>
-                <a:satMod val="130000"/>
-                <a:lumMod val="102000"/>
-              </a:schemeClr>
-            </a:gs>
-            <a:gs pos="100000">
-              <a:schemeClr val="bg1">
-                <a:tint val="98000"/>
-                <a:shade val="78000"/>
-                <a:satMod val="140000"/>
-              </a:schemeClr>
-            </a:gs>
-          </a:gsLst>
-          <a:path path="circle">
-            <a:fillToRect l="100000" t="100000" r="100000" b="100000"/>
-          </a:path>
-        </a:gradFill>
-        <a:effectLst/>
-      </p:bgPr>
-    </p:bg>
-    <p:spTree>
-      <p:nvGrpSpPr>
-        <p:cNvPr id="1" name=""/>
-        <p:cNvGrpSpPr/>
-        <p:nvPr/>
-      </p:nvGrpSpPr>
-      <p:grpSpPr>
-        <a:xfrm>
-          <a:off x="0" y="0"/>
-          <a:ext cx="0" cy="0"/>
-          <a:chOff x="0" y="0"/>
-          <a:chExt cx="0" cy="0"/>
-        </a:xfrm>
-      </p:grpSpPr>
-      <p:sp>
-        <p:nvSpPr>
-          <p:cNvPr id="9" name="Rectangle 8">
-            <a:extLst>
-              <a:ext uri="{FF2B5EF4-FFF2-40B4-BE49-F238E27FC236}">
-                <a16:creationId xmlns:a16="http://schemas.microsoft.com/office/drawing/2014/main" id="{100A9A80-E8FE-48ED-A56B-95801B22181A}"/>
-              </a:ext>
-              <a:ext uri="{C183D7F6-B498-43B3-948B-1728B52AA6E4}">
-                <adec:decorative xmlns:adec="http://schemas.microsoft.com/office/drawing/2017/decorative" val="1"/>
-              </a:ext>
-            </a:extLst>
-          </p:cNvPr>
-          <p:cNvSpPr>
-            <a:spLocks noGrp="1" noRot="1" noChangeAspect="1" noMove="1" noResize="1" noEditPoints="1" noAdjustHandles="1" noChangeArrowheads="1" noChangeShapeType="1" noTextEdit="1"/>
-          </p:cNvSpPr>
-          <p:nvPr>
-            <p:extLst>
-              <p:ext uri="{386F3935-93C4-4BCD-93E2-E3B085C9AB24}">
-                <p16:designElem xmlns:p16="http://schemas.microsoft.com/office/powerpoint/2015/main" val="1"/>
-              </p:ext>
-            </p:extLst>
-          </p:nvPr>
-        </p:nvSpPr>
-        <p:spPr>
-          <a:xfrm>
-            <a:off x="11292840" y="0"/>
-            <a:ext cx="914400" cy="6858000"/>
-          </a:xfrm>
-          <a:prstGeom prst="rect">
-            <a:avLst/>
-          </a:prstGeom>
-          <a:solidFill>
-            <a:srgbClr val="303030"/>
-          </a:solidFill>
-          <a:ln>
-            <a:noFill/>
-          </a:ln>
-        </p:spPr>
-        <p:style>
-          <a:lnRef idx="2">
-            <a:schemeClr val="accent1">
-              <a:shade val="50000"/>
-            </a:schemeClr>
-          </a:lnRef>
-          <a:fillRef idx="1">
-            <a:schemeClr val="accent1"/>
-          </a:fillRef>
-          <a:effectRef idx="0">
-            <a:schemeClr val="accent1"/>
-          </a:effectRef>
-          <a:fontRef idx="minor">
-            <a:schemeClr val="lt1"/>
-          </a:fontRef>
-        </p:style>
-      </p:sp>
-      <p:sp>
-        <p:nvSpPr>
-          <p:cNvPr id="11" name="Rectangle 10">
-            <a:extLst>
-              <a:ext uri="{FF2B5EF4-FFF2-40B4-BE49-F238E27FC236}">
-                <a16:creationId xmlns:a16="http://schemas.microsoft.com/office/drawing/2014/main" id="{E85544B9-05BC-4819-A434-90EE49FAF6C0}"/>
-              </a:ext>
-              <a:ext uri="{C183D7F6-B498-43B3-948B-1728B52AA6E4}">
-                <adec:decorative xmlns:adec="http://schemas.microsoft.com/office/drawing/2017/decorative" val="1"/>
-              </a:ext>
-            </a:extLst>
-          </p:cNvPr>
-          <p:cNvSpPr>
-            <a:spLocks noGrp="1" noRot="1" noChangeAspect="1" noMove="1" noResize="1" noEditPoints="1" noAdjustHandles="1" noChangeArrowheads="1" noChangeShapeType="1" noTextEdit="1"/>
-          </p:cNvSpPr>
-          <p:nvPr>
-            <p:extLst>
-              <p:ext uri="{386F3935-93C4-4BCD-93E2-E3B085C9AB24}">
-                <p16:designElem xmlns:p16="http://schemas.microsoft.com/office/powerpoint/2015/main" val="1"/>
-              </p:ext>
-            </p:extLst>
-          </p:nvPr>
-        </p:nvSpPr>
-        <p:spPr>
-          <a:xfrm>
-            <a:off x="0" y="0"/>
-            <a:ext cx="457200" cy="6858000"/>
-          </a:xfrm>
-          <a:prstGeom prst="rect">
-            <a:avLst/>
-          </a:prstGeom>
-          <a:solidFill>
-            <a:srgbClr val="303030"/>
-          </a:solidFill>
-          <a:ln>
-            <a:noFill/>
-          </a:ln>
-        </p:spPr>
-        <p:style>
-          <a:lnRef idx="2">
-            <a:schemeClr val="accent1">
-              <a:shade val="50000"/>
-            </a:schemeClr>
-          </a:lnRef>
-          <a:fillRef idx="1">
-            <a:schemeClr val="accent1"/>
-          </a:fillRef>
-          <a:effectRef idx="0">
-            <a:schemeClr val="accent1"/>
-          </a:effectRef>
-          <a:fontRef idx="minor">
-            <a:schemeClr val="lt1"/>
-          </a:fontRef>
-        </p:style>
-      </p:sp>
-      <p:sp useBgFill="1">
-        <p:nvSpPr>
-          <p:cNvPr id="13" name="Rectangle 12">
-            <a:extLst>
-              <a:ext uri="{FF2B5EF4-FFF2-40B4-BE49-F238E27FC236}">
-                <a16:creationId xmlns:a16="http://schemas.microsoft.com/office/drawing/2014/main" id="{79C8665A-B6C6-46BB-9012-A922385678AC}"/>
-              </a:ext>
-              <a:ext uri="{C183D7F6-B498-43B3-948B-1728B52AA6E4}">
-                <adec:decorative xmlns:adec="http://schemas.microsoft.com/office/drawing/2017/decorative" val="1"/>
-              </a:ext>
-            </a:extLst>
-          </p:cNvPr>
-          <p:cNvSpPr>
-            <a:spLocks noGrp="1" noRot="1" noChangeAspect="1" noMove="1" noResize="1" noEditPoints="1" noAdjustHandles="1" noChangeArrowheads="1" noChangeShapeType="1" noTextEdit="1"/>
-          </p:cNvSpPr>
-          <p:nvPr>
-            <p:extLst>
-              <p:ext uri="{386F3935-93C4-4BCD-93E2-E3B085C9AB24}">
-                <p16:designElem xmlns:p16="http://schemas.microsoft.com/office/powerpoint/2015/main" val="1"/>
-              </p:ext>
-            </p:extLst>
-          </p:nvPr>
-        </p:nvSpPr>
-        <p:spPr>
-          <a:xfrm>
-            <a:off x="0" y="0"/>
-            <a:ext cx="12192000" cy="6858000"/>
-          </a:xfrm>
-          <a:prstGeom prst="rect">
-            <a:avLst/>
-          </a:prstGeom>
-          <a:ln>
-            <a:noFill/>
-          </a:ln>
-        </p:spPr>
-        <p:style>
-          <a:lnRef idx="2">
-            <a:schemeClr val="accent1">
-              <a:shade val="50000"/>
-            </a:schemeClr>
-          </a:lnRef>
-          <a:fillRef idx="1">
-            <a:schemeClr val="accent1"/>
-          </a:fillRef>
-          <a:effectRef idx="0">
-            <a:schemeClr val="accent1"/>
-          </a:effectRef>
-          <a:fontRef idx="minor">
-            <a:schemeClr val="lt1"/>
-          </a:fontRef>
-        </p:style>
-        <p:txBody>
-          <a:bodyPr rtlCol="0" anchor="ctr"/>
-          <a:lstStyle/>
-          <a:p>
-            <a:pPr algn="ctr"/>
-            <a:endParaRPr lang="en-US"/>
-          </a:p>
-        </p:txBody>
-      </p:sp>
-      <p:sp>
-        <p:nvSpPr>
-          <p:cNvPr id="4" name="Title 3">
-            <a:extLst>
-              <a:ext uri="{FF2B5EF4-FFF2-40B4-BE49-F238E27FC236}">
-                <a16:creationId xmlns:a16="http://schemas.microsoft.com/office/drawing/2014/main" id="{ED552D37-8C90-4CF5-AF09-B18064F5BF56}"/>
-              </a:ext>
-            </a:extLst>
-          </p:cNvPr>
-          <p:cNvSpPr>
-            <a:spLocks noGrp="1"/>
-          </p:cNvSpPr>
-          <p:nvPr>
-            <p:ph type="title"/>
-          </p:nvPr>
-        </p:nvSpPr>
-        <p:spPr>
-          <a:xfrm>
-            <a:off x="1261872" y="758952"/>
-            <a:ext cx="9418320" cy="4041648"/>
-          </a:xfrm>
-        </p:spPr>
-        <p:txBody>
-          <a:bodyPr vert="horz" lIns="91440" tIns="45720" rIns="91440" bIns="45720" rtlCol="0" anchor="b">
-            <a:normAutofit/>
-          </a:bodyPr>
-          <a:lstStyle/>
-          <a:p>
-            <a:r>
-              <a:rPr lang="en-US" dirty="0"/>
-              <a:t>Why do we model data?</a:t>
-            </a:r>
-          </a:p>
-        </p:txBody>
-      </p:sp>
-      <p:sp>
-        <p:nvSpPr>
-          <p:cNvPr id="15" name="Rectangle 14">
-            <a:extLst>
-              <a:ext uri="{FF2B5EF4-FFF2-40B4-BE49-F238E27FC236}">
-                <a16:creationId xmlns:a16="http://schemas.microsoft.com/office/drawing/2014/main" id="{2D8964DE-AB9E-402E-8B81-8AA9BB47981B}"/>
-              </a:ext>
-              <a:ext uri="{C183D7F6-B498-43B3-948B-1728B52AA6E4}">
-                <adec:decorative xmlns:adec="http://schemas.microsoft.com/office/drawing/2017/decorative" val="1"/>
-              </a:ext>
-            </a:extLst>
-          </p:cNvPr>
-          <p:cNvSpPr>
-            <a:spLocks noGrp="1" noRot="1" noChangeAspect="1" noMove="1" noResize="1" noEditPoints="1" noAdjustHandles="1" noChangeArrowheads="1" noChangeShapeType="1" noTextEdit="1"/>
-          </p:cNvSpPr>
-          <p:nvPr>
-            <p:extLst>
-              <p:ext uri="{386F3935-93C4-4BCD-93E2-E3B085C9AB24}">
-                <p16:designElem xmlns:p16="http://schemas.microsoft.com/office/powerpoint/2015/main" val="1"/>
-              </p:ext>
-            </p:extLst>
-          </p:nvPr>
-        </p:nvSpPr>
-        <p:spPr>
-          <a:xfrm>
-            <a:off x="0" y="0"/>
-            <a:ext cx="457200" cy="6858000"/>
-          </a:xfrm>
-          <a:prstGeom prst="rect">
-            <a:avLst/>
-          </a:prstGeom>
-          <a:solidFill>
-            <a:schemeClr val="accent1"/>
-          </a:solidFill>
-          <a:ln>
-            <a:noFill/>
-          </a:ln>
-        </p:spPr>
-        <p:style>
-          <a:lnRef idx="2">
-            <a:schemeClr val="accent1">
-              <a:shade val="50000"/>
-            </a:schemeClr>
-          </a:lnRef>
-          <a:fillRef idx="1">
-            <a:schemeClr val="accent1"/>
-          </a:fillRef>
-          <a:effectRef idx="0">
-            <a:schemeClr val="accent1"/>
-          </a:effectRef>
-          <a:fontRef idx="minor">
-            <a:schemeClr val="lt1"/>
-          </a:fontRef>
-        </p:style>
-      </p:sp>
-      <p:sp>
-        <p:nvSpPr>
-          <p:cNvPr id="17" name="Rectangle 16">
-            <a:extLst>
-              <a:ext uri="{FF2B5EF4-FFF2-40B4-BE49-F238E27FC236}">
-                <a16:creationId xmlns:a16="http://schemas.microsoft.com/office/drawing/2014/main" id="{0361BE5E-E17F-47E3-AF50-969EA826BEE1}"/>
-              </a:ext>
-              <a:ext uri="{C183D7F6-B498-43B3-948B-1728B52AA6E4}">
-                <adec:decorative xmlns:adec="http://schemas.microsoft.com/office/drawing/2017/decorative" val="1"/>
-              </a:ext>
-            </a:extLst>
-          </p:cNvPr>
-          <p:cNvSpPr>
-            <a:spLocks noGrp="1" noRot="1" noChangeAspect="1" noMove="1" noResize="1" noEditPoints="1" noAdjustHandles="1" noChangeArrowheads="1" noChangeShapeType="1" noTextEdit="1"/>
-          </p:cNvSpPr>
-          <p:nvPr>
-            <p:extLst>
-              <p:ext uri="{386F3935-93C4-4BCD-93E2-E3B085C9AB24}">
-                <p16:designElem xmlns:p16="http://schemas.microsoft.com/office/powerpoint/2015/main" val="1"/>
-              </p:ext>
-            </p:extLst>
-          </p:nvPr>
-        </p:nvSpPr>
-        <p:spPr>
-          <a:xfrm>
-            <a:off x="11292840" y="0"/>
-            <a:ext cx="914400" cy="6858000"/>
-          </a:xfrm>
-          <a:prstGeom prst="rect">
-            <a:avLst/>
-          </a:prstGeom>
-          <a:solidFill>
-            <a:schemeClr val="tx2">
-              <a:lumMod val="75000"/>
-            </a:schemeClr>
-          </a:solidFill>
-          <a:ln>
-            <a:noFill/>
-          </a:ln>
-        </p:spPr>
-        <p:style>
-          <a:lnRef idx="2">
-            <a:schemeClr val="accent1">
-              <a:shade val="50000"/>
-            </a:schemeClr>
-          </a:lnRef>
-          <a:fillRef idx="1">
-            <a:schemeClr val="accent1"/>
-          </a:fillRef>
-          <a:effectRef idx="0">
-            <a:schemeClr val="accent1"/>
-          </a:effectRef>
-          <a:fontRef idx="minor">
-            <a:schemeClr val="lt1"/>
-          </a:fontRef>
-        </p:style>
-      </p:sp>
-    </p:spTree>
-    <p:extLst>
-      <p:ext uri="{BB962C8B-B14F-4D97-AF65-F5344CB8AC3E}">
-        <p14:creationId xmlns:p14="http://schemas.microsoft.com/office/powerpoint/2010/main" val="4168405491"/>
-      </p:ext>
-    </p:extLst>
-  </p:cSld>
-  <p:clrMapOvr>
-    <a:overrideClrMapping bg1="lt1" tx1="dk1" bg2="lt2" tx2="dk2" accent1="accent1" accent2="accent2" accent3="accent3" accent4="accent4" accent5="accent5" accent6="accent6" hlink="hlink" folHlink="folHlink"/>
-  </p:clrMapOvr>
-</p:sld>
-</file>
-
-<file path=ppt/slides/slide8.xml><?xml version="1.0" encoding="utf-8"?>
-<p:sld xmlns:a="http://schemas.openxmlformats.org/drawingml/2006/main" xmlns:r="http://schemas.openxmlformats.org/officeDocument/2006/relationships" xmlns:p="http://schemas.openxmlformats.org/presentationml/2006/main">
-  <p:cSld>
-    <p:spTree>
-      <p:nvGrpSpPr>
-        <p:cNvPr id="1" name=""/>
-        <p:cNvGrpSpPr/>
-        <p:nvPr/>
-      </p:nvGrpSpPr>
-      <p:grpSpPr>
-        <a:xfrm>
-          <a:off x="0" y="0"/>
-          <a:ext cx="0" cy="0"/>
-          <a:chOff x="0" y="0"/>
-          <a:chExt cx="0" cy="0"/>
-        </a:xfrm>
-      </p:grpSpPr>
-      <p:sp>
-        <p:nvSpPr>
-          <p:cNvPr id="2" name="Title 1">
-            <a:extLst>
-              <a:ext uri="{FF2B5EF4-FFF2-40B4-BE49-F238E27FC236}">
-                <a16:creationId xmlns:a16="http://schemas.microsoft.com/office/drawing/2014/main" id="{616086BB-A461-49CD-94D5-50E696887F47}"/>
-              </a:ext>
-            </a:extLst>
-          </p:cNvPr>
-          <p:cNvSpPr>
-            <a:spLocks noGrp="1"/>
-          </p:cNvSpPr>
-          <p:nvPr>
-            <p:ph type="title"/>
-          </p:nvPr>
-        </p:nvSpPr>
-        <p:spPr>
-          <a:xfrm>
-            <a:off x="685800" y="764373"/>
-            <a:ext cx="3687417" cy="1920372"/>
-          </a:xfrm>
-        </p:spPr>
-        <p:txBody>
-          <a:bodyPr>
-            <a:normAutofit/>
-          </a:bodyPr>
-          <a:lstStyle/>
-          <a:p>
-            <a:pPr algn="l"/>
-            <a:r>
-              <a:rPr lang="en-US" sz="3600" dirty="0"/>
-              <a:t>Degrees of relationships</a:t>
-            </a:r>
-          </a:p>
-        </p:txBody>
-      </p:sp>
-      <p:sp>
-        <p:nvSpPr>
-          <p:cNvPr id="3" name="Content Placeholder 2">
-            <a:extLst>
-              <a:ext uri="{FF2B5EF4-FFF2-40B4-BE49-F238E27FC236}">
-                <a16:creationId xmlns:a16="http://schemas.microsoft.com/office/drawing/2014/main" id="{4008AB50-1DD5-47E2-B0BD-686A7799A78F}"/>
-              </a:ext>
-            </a:extLst>
-          </p:cNvPr>
-          <p:cNvSpPr>
-            <a:spLocks noGrp="1"/>
-          </p:cNvSpPr>
-          <p:nvPr>
-            <p:ph idx="1"/>
-          </p:nvPr>
-        </p:nvSpPr>
-        <p:spPr>
-          <a:xfrm>
-            <a:off x="685800" y="2821774"/>
-            <a:ext cx="3687417" cy="3148329"/>
-          </a:xfrm>
-        </p:spPr>
-        <p:txBody>
-          <a:bodyPr>
-            <a:normAutofit/>
-          </a:bodyPr>
-          <a:lstStyle/>
-          <a:p>
-            <a:r>
-              <a:rPr lang="en-US" sz="1600" dirty="0"/>
-              <a:t>Relationship can be mandatory or optional</a:t>
-            </a:r>
-          </a:p>
-          <a:p>
-            <a:pPr lvl="1"/>
-            <a:r>
-              <a:rPr lang="en-US" sz="1600" dirty="0">
-                <a:solidFill>
-                  <a:schemeClr val="tx1"/>
-                </a:solidFill>
-              </a:rPr>
-              <a:t>O = optional</a:t>
-            </a:r>
-          </a:p>
-          <a:p>
-            <a:pPr lvl="1"/>
-            <a:r>
-              <a:rPr lang="en-US" sz="1600" dirty="0">
-                <a:solidFill>
-                  <a:schemeClr val="tx1"/>
-                </a:solidFill>
-              </a:rPr>
-              <a:t>| </a:t>
-            </a:r>
-            <a:r>
-              <a:rPr lang="en-US" sz="1600">
-                <a:solidFill>
-                  <a:schemeClr val="tx1"/>
-                </a:solidFill>
-              </a:rPr>
-              <a:t>= mandatory</a:t>
-            </a:r>
-            <a:endParaRPr lang="en-US" sz="1600" dirty="0">
-              <a:solidFill>
-                <a:schemeClr val="tx1"/>
-              </a:solidFill>
-            </a:endParaRPr>
-          </a:p>
-          <a:p>
-            <a:r>
-              <a:rPr lang="en-US" sz="1600" dirty="0"/>
-              <a:t>Cardinality = relationship of data in one entity to another entity (table to another table)</a:t>
-            </a:r>
-          </a:p>
-          <a:p>
-            <a:pPr lvl="1"/>
-            <a:r>
-              <a:rPr lang="en-US" sz="1400" dirty="0">
-                <a:solidFill>
-                  <a:schemeClr val="tx1"/>
-                </a:solidFill>
-              </a:rPr>
-              <a:t>O = zero</a:t>
-            </a:r>
-          </a:p>
-          <a:p>
-            <a:pPr lvl="1"/>
-            <a:r>
-              <a:rPr lang="en-US" sz="1400" dirty="0">
-                <a:solidFill>
-                  <a:schemeClr val="tx1"/>
-                </a:solidFill>
-              </a:rPr>
-              <a:t>| = one</a:t>
-            </a:r>
-          </a:p>
-          <a:p>
-            <a:pPr lvl="1"/>
-            <a:r>
-              <a:rPr lang="en-US" sz="1400" dirty="0">
-                <a:solidFill>
-                  <a:schemeClr val="tx1"/>
-                </a:solidFill>
-              </a:rPr>
-              <a:t>&gt; = many</a:t>
-            </a:r>
-          </a:p>
-          <a:p>
-            <a:pPr lvl="1"/>
-            <a:endParaRPr lang="en-US" sz="1400" dirty="0">
-              <a:solidFill>
-                <a:schemeClr val="tx1"/>
-              </a:solidFill>
-            </a:endParaRPr>
-          </a:p>
-          <a:p>
-            <a:pPr marL="457200" lvl="1" indent="0">
-              <a:buNone/>
-            </a:pPr>
-            <a:endParaRPr lang="en-US" sz="1400" dirty="0">
-              <a:solidFill>
-                <a:schemeClr val="tx1"/>
-              </a:solidFill>
-            </a:endParaRPr>
-          </a:p>
-        </p:txBody>
-      </p:sp>
-      <p:pic>
-        <p:nvPicPr>
-          <p:cNvPr id="7" name="Picture 6">
-            <a:extLst>
-              <a:ext uri="{FF2B5EF4-FFF2-40B4-BE49-F238E27FC236}">
-                <a16:creationId xmlns:a16="http://schemas.microsoft.com/office/drawing/2014/main" id="{AFA6D441-3AB7-4173-8B91-DC6307912395}"/>
-              </a:ext>
-            </a:extLst>
-          </p:cNvPr>
-          <p:cNvPicPr>
-            <a:picLocks noChangeAspect="1"/>
-          </p:cNvPicPr>
-          <p:nvPr/>
-        </p:nvPicPr>
-        <p:blipFill>
-          <a:blip r:embed="rId2"/>
-          <a:stretch>
-            <a:fillRect/>
-          </a:stretch>
-        </p:blipFill>
-        <p:spPr>
-          <a:xfrm>
-            <a:off x="6096000" y="0"/>
-            <a:ext cx="4423409" cy="6857999"/>
-          </a:xfrm>
-          <a:prstGeom prst="rect">
-            <a:avLst/>
-          </a:prstGeom>
-        </p:spPr>
-      </p:pic>
-    </p:spTree>
-    <p:extLst>
-      <p:ext uri="{BB962C8B-B14F-4D97-AF65-F5344CB8AC3E}">
-        <p14:creationId xmlns:p14="http://schemas.microsoft.com/office/powerpoint/2010/main" val="3957850518"/>
-      </p:ext>
-    </p:extLst>
-  </p:cSld>
-  <p:clrMapOvr>
-    <a:masterClrMapping/>
-  </p:clrMapOvr>
-</p:sld>
-</file>
-
-<file path=ppt/slides/slide9.xml><?xml version="1.0" encoding="utf-8"?>
-<p:sld xmlns:a="http://schemas.openxmlformats.org/drawingml/2006/main" xmlns:r="http://schemas.openxmlformats.org/officeDocument/2006/relationships" xmlns:p="http://schemas.openxmlformats.org/presentationml/2006/main">
-  <p:cSld>
     <p:bg>
       <p:bgPr>
         <a:solidFill>
@@ -8243,6 +6144,2329 @@
       <p:bldP spid="2" grpId="0"/>
     </p:bldLst>
   </p:timing>
+</p:sld>
+</file>
+
+<file path=ppt/slides/slide11.xml><?xml version="1.0" encoding="utf-8"?>
+<p:sld xmlns:a="http://schemas.openxmlformats.org/drawingml/2006/main" xmlns:r="http://schemas.openxmlformats.org/officeDocument/2006/relationships" xmlns:p="http://schemas.openxmlformats.org/presentationml/2006/main">
+  <p:cSld>
+    <p:spTree>
+      <p:nvGrpSpPr>
+        <p:cNvPr id="1" name=""/>
+        <p:cNvGrpSpPr/>
+        <p:nvPr/>
+      </p:nvGrpSpPr>
+      <p:grpSpPr>
+        <a:xfrm>
+          <a:off x="0" y="0"/>
+          <a:ext cx="0" cy="0"/>
+          <a:chOff x="0" y="0"/>
+          <a:chExt cx="0" cy="0"/>
+        </a:xfrm>
+      </p:grpSpPr>
+      <p:pic>
+        <p:nvPicPr>
+          <p:cNvPr id="10" name="Picture 9" descr="Diagram&#10;&#10;Description automatically generated">
+            <a:extLst>
+              <a:ext uri="{FF2B5EF4-FFF2-40B4-BE49-F238E27FC236}">
+                <a16:creationId xmlns:a16="http://schemas.microsoft.com/office/drawing/2014/main" id="{C35F24F2-D1A4-43CC-8252-35E7BA7D68B8}"/>
+              </a:ext>
+            </a:extLst>
+          </p:cNvPr>
+          <p:cNvPicPr>
+            <a:picLocks noChangeAspect="1"/>
+          </p:cNvPicPr>
+          <p:nvPr/>
+        </p:nvPicPr>
+        <p:blipFill>
+          <a:blip r:embed="rId2">
+            <a:extLst>
+              <a:ext uri="{28A0092B-C50C-407E-A947-70E740481C1C}">
+                <a14:useLocalDpi xmlns:a14="http://schemas.microsoft.com/office/drawing/2010/main" val="0"/>
+              </a:ext>
+            </a:extLst>
+          </a:blip>
+          <a:stretch>
+            <a:fillRect/>
+          </a:stretch>
+        </p:blipFill>
+        <p:spPr>
+          <a:xfrm>
+            <a:off x="1523999" y="0"/>
+            <a:ext cx="9077325" cy="6807994"/>
+          </a:xfrm>
+          <a:prstGeom prst="rect">
+            <a:avLst/>
+          </a:prstGeom>
+        </p:spPr>
+      </p:pic>
+    </p:spTree>
+    <p:extLst>
+      <p:ext uri="{BB962C8B-B14F-4D97-AF65-F5344CB8AC3E}">
+        <p14:creationId xmlns:p14="http://schemas.microsoft.com/office/powerpoint/2010/main" val="1282836977"/>
+      </p:ext>
+    </p:extLst>
+  </p:cSld>
+  <p:clrMapOvr>
+    <a:masterClrMapping/>
+  </p:clrMapOvr>
+</p:sld>
+</file>
+
+<file path=ppt/slides/slide12.xml><?xml version="1.0" encoding="utf-8"?>
+<p:sld xmlns:a="http://schemas.openxmlformats.org/drawingml/2006/main" xmlns:r="http://schemas.openxmlformats.org/officeDocument/2006/relationships" xmlns:p="http://schemas.openxmlformats.org/presentationml/2006/main">
+  <p:cSld>
+    <p:spTree>
+      <p:nvGrpSpPr>
+        <p:cNvPr id="1" name=""/>
+        <p:cNvGrpSpPr/>
+        <p:nvPr/>
+      </p:nvGrpSpPr>
+      <p:grpSpPr>
+        <a:xfrm>
+          <a:off x="0" y="0"/>
+          <a:ext cx="0" cy="0"/>
+          <a:chOff x="0" y="0"/>
+          <a:chExt cx="0" cy="0"/>
+        </a:xfrm>
+      </p:grpSpPr>
+      <p:sp>
+        <p:nvSpPr>
+          <p:cNvPr id="2" name="Title 1">
+            <a:extLst>
+              <a:ext uri="{FF2B5EF4-FFF2-40B4-BE49-F238E27FC236}">
+                <a16:creationId xmlns:a16="http://schemas.microsoft.com/office/drawing/2014/main" id="{4FAD9F3F-67F1-4324-876E-D6F7A55ACEAB}"/>
+              </a:ext>
+            </a:extLst>
+          </p:cNvPr>
+          <p:cNvSpPr>
+            <a:spLocks noGrp="1"/>
+          </p:cNvSpPr>
+          <p:nvPr>
+            <p:ph type="title"/>
+          </p:nvPr>
+        </p:nvSpPr>
+        <p:spPr>
+          <a:xfrm>
+            <a:off x="685800" y="764373"/>
+            <a:ext cx="5410200" cy="1293028"/>
+          </a:xfrm>
+        </p:spPr>
+        <p:txBody>
+          <a:bodyPr>
+            <a:normAutofit/>
+          </a:bodyPr>
+          <a:lstStyle/>
+          <a:p>
+            <a:r>
+              <a:rPr lang="en-US" sz="3200" dirty="0"/>
+              <a:t>Data Stewardship</a:t>
+            </a:r>
+          </a:p>
+        </p:txBody>
+      </p:sp>
+      <p:sp>
+        <p:nvSpPr>
+          <p:cNvPr id="3" name="Content Placeholder 2">
+            <a:extLst>
+              <a:ext uri="{FF2B5EF4-FFF2-40B4-BE49-F238E27FC236}">
+                <a16:creationId xmlns:a16="http://schemas.microsoft.com/office/drawing/2014/main" id="{9DC507E5-73C8-4252-9C8E-68C575B6F44C}"/>
+              </a:ext>
+            </a:extLst>
+          </p:cNvPr>
+          <p:cNvSpPr>
+            <a:spLocks noGrp="1"/>
+          </p:cNvSpPr>
+          <p:nvPr>
+            <p:ph idx="1"/>
+          </p:nvPr>
+        </p:nvSpPr>
+        <p:spPr>
+          <a:xfrm>
+            <a:off x="685801" y="2194560"/>
+            <a:ext cx="3306742" cy="4024125"/>
+          </a:xfrm>
+        </p:spPr>
+        <p:txBody>
+          <a:bodyPr>
+            <a:normAutofit/>
+          </a:bodyPr>
+          <a:lstStyle/>
+          <a:p>
+            <a:r>
+              <a:rPr lang="en-US" sz="1600" dirty="0"/>
+              <a:t>Rule of thumb for what data documentation needs </a:t>
+            </a:r>
+            <a:r>
+              <a:rPr lang="en-US" sz="1600"/>
+              <a:t>to achieve</a:t>
+            </a:r>
+            <a:endParaRPr lang="en-US" sz="1600" dirty="0"/>
+          </a:p>
+        </p:txBody>
+      </p:sp>
+      <p:pic>
+        <p:nvPicPr>
+          <p:cNvPr id="1026" name="Picture 2">
+            <a:extLst>
+              <a:ext uri="{FF2B5EF4-FFF2-40B4-BE49-F238E27FC236}">
+                <a16:creationId xmlns:a16="http://schemas.microsoft.com/office/drawing/2014/main" id="{C3DA6FBF-943A-49DE-9105-664CCEC147B0}"/>
+              </a:ext>
+            </a:extLst>
+          </p:cNvPr>
+          <p:cNvPicPr>
+            <a:picLocks noChangeAspect="1" noChangeArrowheads="1"/>
+          </p:cNvPicPr>
+          <p:nvPr/>
+        </p:nvPicPr>
+        <p:blipFill>
+          <a:blip r:embed="rId2">
+            <a:extLst>
+              <a:ext uri="{28A0092B-C50C-407E-A947-70E740481C1C}">
+                <a14:useLocalDpi xmlns:a14="http://schemas.microsoft.com/office/drawing/2010/main" val="0"/>
+              </a:ext>
+            </a:extLst>
+          </a:blip>
+          <a:stretch>
+            <a:fillRect/>
+          </a:stretch>
+        </p:blipFill>
+        <p:spPr bwMode="auto">
+          <a:xfrm>
+            <a:off x="4955339" y="2598711"/>
+            <a:ext cx="6127287" cy="2083277"/>
+          </a:xfrm>
+          <a:prstGeom prst="rect">
+            <a:avLst/>
+          </a:prstGeom>
+          <a:noFill/>
+          <a:extLst>
+            <a:ext uri="{909E8E84-426E-40DD-AFC4-6F175D3DCCD1}">
+              <a14:hiddenFill xmlns:a14="http://schemas.microsoft.com/office/drawing/2010/main">
+                <a:solidFill>
+                  <a:srgbClr val="FFFFFF"/>
+                </a:solidFill>
+              </a14:hiddenFill>
+            </a:ext>
+          </a:extLst>
+        </p:spPr>
+      </p:pic>
+    </p:spTree>
+    <p:extLst>
+      <p:ext uri="{BB962C8B-B14F-4D97-AF65-F5344CB8AC3E}">
+        <p14:creationId xmlns:p14="http://schemas.microsoft.com/office/powerpoint/2010/main" val="4192105085"/>
+      </p:ext>
+    </p:extLst>
+  </p:cSld>
+  <p:clrMapOvr>
+    <a:masterClrMapping/>
+  </p:clrMapOvr>
+</p:sld>
+</file>
+
+<file path=ppt/slides/slide13.xml><?xml version="1.0" encoding="utf-8"?>
+<p:sld xmlns:a="http://schemas.openxmlformats.org/drawingml/2006/main" xmlns:r="http://schemas.openxmlformats.org/officeDocument/2006/relationships" xmlns:p="http://schemas.openxmlformats.org/presentationml/2006/main">
+  <p:cSld>
+    <p:spTree>
+      <p:nvGrpSpPr>
+        <p:cNvPr id="1" name=""/>
+        <p:cNvGrpSpPr/>
+        <p:nvPr/>
+      </p:nvGrpSpPr>
+      <p:grpSpPr>
+        <a:xfrm>
+          <a:off x="0" y="0"/>
+          <a:ext cx="0" cy="0"/>
+          <a:chOff x="0" y="0"/>
+          <a:chExt cx="0" cy="0"/>
+        </a:xfrm>
+      </p:grpSpPr>
+      <p:sp>
+        <p:nvSpPr>
+          <p:cNvPr id="2" name="Title 1">
+            <a:extLst>
+              <a:ext uri="{FF2B5EF4-FFF2-40B4-BE49-F238E27FC236}">
+                <a16:creationId xmlns:a16="http://schemas.microsoft.com/office/drawing/2014/main" id="{64963815-EAA3-4804-B5A8-B0A8CA5778B7}"/>
+              </a:ext>
+            </a:extLst>
+          </p:cNvPr>
+          <p:cNvSpPr>
+            <a:spLocks noGrp="1"/>
+          </p:cNvSpPr>
+          <p:nvPr>
+            <p:ph type="title"/>
+          </p:nvPr>
+        </p:nvSpPr>
+        <p:spPr/>
+        <p:txBody>
+          <a:bodyPr/>
+          <a:lstStyle/>
+          <a:p>
+            <a:r>
+              <a:rPr lang="en-US" dirty="0"/>
+              <a:t>Practice (10 minutes)</a:t>
+            </a:r>
+          </a:p>
+        </p:txBody>
+      </p:sp>
+      <p:sp>
+        <p:nvSpPr>
+          <p:cNvPr id="3" name="Content Placeholder 2">
+            <a:extLst>
+              <a:ext uri="{FF2B5EF4-FFF2-40B4-BE49-F238E27FC236}">
+                <a16:creationId xmlns:a16="http://schemas.microsoft.com/office/drawing/2014/main" id="{AEC957F8-C263-4013-8EA9-46F315961E1E}"/>
+              </a:ext>
+            </a:extLst>
+          </p:cNvPr>
+          <p:cNvSpPr>
+            <a:spLocks noGrp="1"/>
+          </p:cNvSpPr>
+          <p:nvPr>
+            <p:ph idx="1"/>
+          </p:nvPr>
+        </p:nvSpPr>
+        <p:spPr/>
+        <p:txBody>
+          <a:bodyPr/>
+          <a:lstStyle/>
+          <a:p>
+            <a:pPr marL="0" indent="0">
+              <a:buNone/>
+            </a:pPr>
+            <a:r>
+              <a:rPr lang="en-US" dirty="0"/>
+              <a:t>1. Create an account on lucidchart.com </a:t>
+            </a:r>
+          </a:p>
+          <a:p>
+            <a:pPr marL="0" indent="0">
+              <a:buNone/>
+            </a:pPr>
+            <a:r>
+              <a:rPr lang="en-US" dirty="0"/>
+              <a:t>2. Create a basic ERD for a gym.  You can just use entities, you do not need to use tables. Include the relationship and cardinality</a:t>
+            </a:r>
+          </a:p>
+        </p:txBody>
+      </p:sp>
+    </p:spTree>
+    <p:extLst>
+      <p:ext uri="{BB962C8B-B14F-4D97-AF65-F5344CB8AC3E}">
+        <p14:creationId xmlns:p14="http://schemas.microsoft.com/office/powerpoint/2010/main" val="1393956586"/>
+      </p:ext>
+    </p:extLst>
+  </p:cSld>
+  <p:clrMapOvr>
+    <a:masterClrMapping/>
+  </p:clrMapOvr>
+</p:sld>
+</file>
+
+<file path=ppt/slides/slide14.xml><?xml version="1.0" encoding="utf-8"?>
+<p:sld xmlns:a="http://schemas.openxmlformats.org/drawingml/2006/main" xmlns:r="http://schemas.openxmlformats.org/officeDocument/2006/relationships" xmlns:p="http://schemas.openxmlformats.org/presentationml/2006/main">
+  <p:cSld>
+    <p:spTree>
+      <p:nvGrpSpPr>
+        <p:cNvPr id="1" name=""/>
+        <p:cNvGrpSpPr/>
+        <p:nvPr/>
+      </p:nvGrpSpPr>
+      <p:grpSpPr>
+        <a:xfrm>
+          <a:off x="0" y="0"/>
+          <a:ext cx="0" cy="0"/>
+          <a:chOff x="0" y="0"/>
+          <a:chExt cx="0" cy="0"/>
+        </a:xfrm>
+      </p:grpSpPr>
+      <p:sp>
+        <p:nvSpPr>
+          <p:cNvPr id="4" name="Title 3">
+            <a:extLst>
+              <a:ext uri="{FF2B5EF4-FFF2-40B4-BE49-F238E27FC236}">
+                <a16:creationId xmlns:a16="http://schemas.microsoft.com/office/drawing/2014/main" id="{297BDE90-8DCF-4039-AB05-11C3F09C3813}"/>
+              </a:ext>
+            </a:extLst>
+          </p:cNvPr>
+          <p:cNvSpPr>
+            <a:spLocks noGrp="1"/>
+          </p:cNvSpPr>
+          <p:nvPr>
+            <p:ph type="ctrTitle"/>
+          </p:nvPr>
+        </p:nvSpPr>
+        <p:spPr/>
+        <p:txBody>
+          <a:bodyPr/>
+          <a:lstStyle/>
+          <a:p>
+            <a:r>
+              <a:rPr lang="en-US" dirty="0"/>
+              <a:t>Break (15 Minutes)</a:t>
+            </a:r>
+          </a:p>
+        </p:txBody>
+      </p:sp>
+      <p:sp>
+        <p:nvSpPr>
+          <p:cNvPr id="5" name="Subtitle 4">
+            <a:extLst>
+              <a:ext uri="{FF2B5EF4-FFF2-40B4-BE49-F238E27FC236}">
+                <a16:creationId xmlns:a16="http://schemas.microsoft.com/office/drawing/2014/main" id="{AE43AD4D-53BE-4D90-B4EE-A313556AC5A9}"/>
+              </a:ext>
+            </a:extLst>
+          </p:cNvPr>
+          <p:cNvSpPr>
+            <a:spLocks noGrp="1"/>
+          </p:cNvSpPr>
+          <p:nvPr>
+            <p:ph type="subTitle" idx="1"/>
+          </p:nvPr>
+        </p:nvSpPr>
+        <p:spPr/>
+        <p:txBody>
+          <a:bodyPr/>
+          <a:lstStyle/>
+          <a:p>
+            <a:r>
+              <a:rPr lang="en-US" dirty="0"/>
+              <a:t>Attendance word: </a:t>
+            </a:r>
+            <a:r>
+              <a:rPr lang="en-US" b="0" i="0" dirty="0" err="1">
+                <a:solidFill>
+                  <a:schemeClr val="tx1"/>
+                </a:solidFill>
+                <a:effectLst/>
+                <a:latin typeface="Slack-Lato"/>
+              </a:rPr>
+              <a:t>TopTechnologist</a:t>
+            </a:r>
+            <a:endParaRPr lang="en-US" dirty="0">
+              <a:solidFill>
+                <a:schemeClr val="tx1"/>
+              </a:solidFill>
+            </a:endParaRPr>
+          </a:p>
+        </p:txBody>
+      </p:sp>
+    </p:spTree>
+    <p:extLst>
+      <p:ext uri="{BB962C8B-B14F-4D97-AF65-F5344CB8AC3E}">
+        <p14:creationId xmlns:p14="http://schemas.microsoft.com/office/powerpoint/2010/main" val="3877287137"/>
+      </p:ext>
+    </p:extLst>
+  </p:cSld>
+  <p:clrMapOvr>
+    <a:masterClrMapping/>
+  </p:clrMapOvr>
+</p:sld>
+</file>
+
+<file path=ppt/slides/slide15.xml><?xml version="1.0" encoding="utf-8"?>
+<p:sld xmlns:a="http://schemas.openxmlformats.org/drawingml/2006/main" xmlns:r="http://schemas.openxmlformats.org/officeDocument/2006/relationships" xmlns:p="http://schemas.openxmlformats.org/presentationml/2006/main">
+  <p:cSld>
+    <p:spTree>
+      <p:nvGrpSpPr>
+        <p:cNvPr id="1" name=""/>
+        <p:cNvGrpSpPr/>
+        <p:nvPr/>
+      </p:nvGrpSpPr>
+      <p:grpSpPr>
+        <a:xfrm>
+          <a:off x="0" y="0"/>
+          <a:ext cx="0" cy="0"/>
+          <a:chOff x="0" y="0"/>
+          <a:chExt cx="0" cy="0"/>
+        </a:xfrm>
+      </p:grpSpPr>
+      <p:sp>
+        <p:nvSpPr>
+          <p:cNvPr id="4" name="Content Placeholder 3">
+            <a:extLst>
+              <a:ext uri="{FF2B5EF4-FFF2-40B4-BE49-F238E27FC236}">
+                <a16:creationId xmlns:a16="http://schemas.microsoft.com/office/drawing/2014/main" id="{23FDEBE0-2BAD-446D-96CE-F0320E3CA029}"/>
+              </a:ext>
+            </a:extLst>
+          </p:cNvPr>
+          <p:cNvSpPr>
+            <a:spLocks noGrp="1"/>
+          </p:cNvSpPr>
+          <p:nvPr>
+            <p:ph sz="half" idx="1"/>
+          </p:nvPr>
+        </p:nvSpPr>
+        <p:spPr/>
+        <p:txBody>
+          <a:bodyPr/>
+          <a:lstStyle/>
+          <a:p>
+            <a:r>
+              <a:rPr lang="en-US" dirty="0"/>
+              <a:t>A subquery is a query nested in a larger query</a:t>
+            </a:r>
+          </a:p>
+          <a:p>
+            <a:pPr lvl="1"/>
+            <a:r>
+              <a:rPr lang="en-US" dirty="0"/>
+              <a:t>In the SELECT, FROM, or WHERE clauses</a:t>
+            </a:r>
+          </a:p>
+          <a:p>
+            <a:r>
+              <a:rPr lang="en-US" dirty="0"/>
+              <a:t>The inner query executes before the parent query so the inner query result can be used in the parent query</a:t>
+            </a:r>
+          </a:p>
+          <a:p>
+            <a:r>
+              <a:rPr lang="en-US" dirty="0"/>
+              <a:t>Should rarely use in production systems BECAUSE joins are almost always more efficient. BUT:</a:t>
+            </a:r>
+          </a:p>
+          <a:p>
+            <a:pPr lvl="1"/>
+            <a:r>
+              <a:rPr lang="en-US" dirty="0"/>
+              <a:t>Not always possible to use a join</a:t>
+            </a:r>
+          </a:p>
+          <a:p>
+            <a:pPr lvl="1"/>
+            <a:r>
+              <a:rPr lang="en-US" dirty="0"/>
+              <a:t>Subqueries often used with update, insert, and delete</a:t>
+            </a:r>
+          </a:p>
+        </p:txBody>
+      </p:sp>
+      <p:sp>
+        <p:nvSpPr>
+          <p:cNvPr id="5" name="Content Placeholder 4">
+            <a:extLst>
+              <a:ext uri="{FF2B5EF4-FFF2-40B4-BE49-F238E27FC236}">
+                <a16:creationId xmlns:a16="http://schemas.microsoft.com/office/drawing/2014/main" id="{1D309249-B5A3-4522-AB7B-23CF5DED75B7}"/>
+              </a:ext>
+            </a:extLst>
+          </p:cNvPr>
+          <p:cNvSpPr>
+            <a:spLocks noGrp="1"/>
+          </p:cNvSpPr>
+          <p:nvPr>
+            <p:ph sz="half" idx="2"/>
+          </p:nvPr>
+        </p:nvSpPr>
+        <p:spPr>
+          <a:xfrm>
+            <a:off x="6187833" y="1943099"/>
+            <a:ext cx="5384800" cy="4398433"/>
+          </a:xfrm>
+        </p:spPr>
+        <p:txBody>
+          <a:bodyPr>
+            <a:normAutofit/>
+          </a:bodyPr>
+          <a:lstStyle/>
+          <a:p>
+            <a:pPr marL="0" indent="0">
+              <a:buNone/>
+            </a:pPr>
+            <a:r>
+              <a:rPr lang="en-US" b="0" i="0" dirty="0">
+                <a:effectLst/>
+                <a:latin typeface="Consolas" panose="020B0609020204030204" pitchFamily="49" charset="0"/>
+              </a:rPr>
+              <a:t>SELECT </a:t>
+            </a:r>
+            <a:r>
+              <a:rPr lang="en-US" b="0" i="1" dirty="0" err="1">
+                <a:effectLst/>
+                <a:latin typeface="Consolas" panose="020B0609020204030204" pitchFamily="49" charset="0"/>
+              </a:rPr>
+              <a:t>column_name</a:t>
+            </a:r>
+            <a:r>
+              <a:rPr lang="en-US" b="0" i="1" dirty="0">
+                <a:effectLst/>
+                <a:latin typeface="Consolas" panose="020B0609020204030204" pitchFamily="49" charset="0"/>
+              </a:rPr>
+              <a:t>(s)</a:t>
+            </a:r>
+            <a:br>
+              <a:rPr lang="en-US" dirty="0"/>
+            </a:br>
+            <a:r>
+              <a:rPr lang="en-US" b="0" i="0" dirty="0">
+                <a:effectLst/>
+                <a:latin typeface="Consolas" panose="020B0609020204030204" pitchFamily="49" charset="0"/>
+              </a:rPr>
+              <a:t>FROM </a:t>
+            </a:r>
+            <a:r>
+              <a:rPr lang="en-US" b="0" i="1" dirty="0" err="1">
+                <a:effectLst/>
+                <a:latin typeface="Consolas" panose="020B0609020204030204" pitchFamily="49" charset="0"/>
+              </a:rPr>
+              <a:t>table_name</a:t>
+            </a:r>
+            <a:br>
+              <a:rPr lang="en-US" dirty="0"/>
+            </a:br>
+            <a:r>
+              <a:rPr lang="en-US" b="0" i="0" dirty="0">
+                <a:effectLst/>
+                <a:latin typeface="Consolas" panose="020B0609020204030204" pitchFamily="49" charset="0"/>
+              </a:rPr>
+              <a:t>WHERE </a:t>
+            </a:r>
+            <a:r>
+              <a:rPr lang="en-US" b="0" i="1" dirty="0" err="1">
+                <a:effectLst/>
+                <a:latin typeface="Consolas" panose="020B0609020204030204" pitchFamily="49" charset="0"/>
+              </a:rPr>
+              <a:t>column_name</a:t>
+            </a:r>
+            <a:r>
+              <a:rPr lang="en-US" b="0" i="1" dirty="0">
+                <a:effectLst/>
+                <a:latin typeface="Consolas" panose="020B0609020204030204" pitchFamily="49" charset="0"/>
+              </a:rPr>
+              <a:t> operator</a:t>
+            </a:r>
+            <a:r>
+              <a:rPr lang="en-US" b="0" i="0" dirty="0">
+                <a:effectLst/>
+                <a:latin typeface="Consolas" panose="020B0609020204030204" pitchFamily="49" charset="0"/>
+              </a:rPr>
+              <a:t> ANY/ALL</a:t>
+            </a:r>
+            <a:br>
+              <a:rPr lang="en-US" dirty="0"/>
+            </a:br>
+            <a:r>
+              <a:rPr lang="en-US" b="0" i="0" dirty="0">
+                <a:effectLst/>
+                <a:latin typeface="Consolas" panose="020B0609020204030204" pitchFamily="49" charset="0"/>
+              </a:rPr>
+              <a:t>(SELECT </a:t>
+            </a:r>
+            <a:r>
+              <a:rPr lang="en-US" b="0" i="1" dirty="0" err="1">
+                <a:effectLst/>
+                <a:latin typeface="Consolas" panose="020B0609020204030204" pitchFamily="49" charset="0"/>
+              </a:rPr>
+              <a:t>column_name</a:t>
+            </a:r>
+            <a:r>
+              <a:rPr lang="en-US" b="0" i="1" dirty="0">
+                <a:effectLst/>
+                <a:latin typeface="Consolas" panose="020B0609020204030204" pitchFamily="49" charset="0"/>
+              </a:rPr>
+              <a:t> </a:t>
+            </a:r>
+            <a:r>
+              <a:rPr lang="en-US" b="0" i="0" dirty="0">
+                <a:effectLst/>
+                <a:latin typeface="Consolas" panose="020B0609020204030204" pitchFamily="49" charset="0"/>
+              </a:rPr>
+              <a:t>FROM </a:t>
+            </a:r>
+            <a:r>
+              <a:rPr lang="en-US" b="0" i="1" dirty="0" err="1">
+                <a:effectLst/>
+                <a:latin typeface="Consolas" panose="020B0609020204030204" pitchFamily="49" charset="0"/>
+              </a:rPr>
+              <a:t>table_name</a:t>
+            </a:r>
+            <a:r>
+              <a:rPr lang="en-US" b="0" i="0" dirty="0">
+                <a:effectLst/>
+                <a:latin typeface="Consolas" panose="020B0609020204030204" pitchFamily="49" charset="0"/>
+              </a:rPr>
+              <a:t> </a:t>
+            </a:r>
+          </a:p>
+          <a:p>
+            <a:pPr marL="0" indent="0">
+              <a:buNone/>
+            </a:pPr>
+            <a:r>
+              <a:rPr lang="en-US" b="0" i="0" dirty="0">
+                <a:effectLst/>
+                <a:latin typeface="Consolas" panose="020B0609020204030204" pitchFamily="49" charset="0"/>
+              </a:rPr>
+              <a:t>WHERE </a:t>
+            </a:r>
+            <a:r>
+              <a:rPr lang="en-US" b="0" i="1" dirty="0">
+                <a:effectLst/>
+                <a:latin typeface="Consolas" panose="020B0609020204030204" pitchFamily="49" charset="0"/>
+              </a:rPr>
+              <a:t>condition</a:t>
+            </a:r>
+            <a:r>
+              <a:rPr lang="en-US" b="0" i="0" dirty="0">
+                <a:effectLst/>
+                <a:latin typeface="Consolas" panose="020B0609020204030204" pitchFamily="49" charset="0"/>
+              </a:rPr>
+              <a:t>);</a:t>
+            </a:r>
+            <a:r>
+              <a:rPr lang="en-US" b="0" i="1" dirty="0">
+                <a:solidFill>
+                  <a:srgbClr val="000000"/>
+                </a:solidFill>
+                <a:effectLst/>
+                <a:latin typeface="Consolas" panose="020B0609020204030204" pitchFamily="49" charset="0"/>
+              </a:rPr>
+              <a:t>or subquery);</a:t>
+            </a:r>
+            <a:endParaRPr lang="en-US" b="0" i="0" dirty="0">
+              <a:solidFill>
+                <a:srgbClr val="5F6364"/>
+              </a:solidFill>
+              <a:effectLst/>
+              <a:latin typeface="Consolas" panose="020B0609020204030204" pitchFamily="49" charset="0"/>
+            </a:endParaRPr>
+          </a:p>
+        </p:txBody>
+      </p:sp>
+      <p:sp>
+        <p:nvSpPr>
+          <p:cNvPr id="2" name="Title 1">
+            <a:extLst>
+              <a:ext uri="{FF2B5EF4-FFF2-40B4-BE49-F238E27FC236}">
+                <a16:creationId xmlns:a16="http://schemas.microsoft.com/office/drawing/2014/main" id="{051E2BC6-637F-4EC8-83D4-311D67F7CC00}"/>
+              </a:ext>
+            </a:extLst>
+          </p:cNvPr>
+          <p:cNvSpPr>
+            <a:spLocks noGrp="1"/>
+          </p:cNvSpPr>
+          <p:nvPr>
+            <p:ph type="title" idx="4294967295"/>
+          </p:nvPr>
+        </p:nvSpPr>
+        <p:spPr>
+          <a:xfrm>
+            <a:off x="197708" y="-164042"/>
+            <a:ext cx="10983913" cy="968375"/>
+          </a:xfrm>
+        </p:spPr>
+        <p:txBody>
+          <a:bodyPr/>
+          <a:lstStyle/>
+          <a:p>
+            <a:r>
+              <a:rPr lang="en-US" dirty="0"/>
+              <a:t>Subqueries</a:t>
+            </a:r>
+          </a:p>
+        </p:txBody>
+      </p:sp>
+    </p:spTree>
+    <p:extLst>
+      <p:ext uri="{BB962C8B-B14F-4D97-AF65-F5344CB8AC3E}">
+        <p14:creationId xmlns:p14="http://schemas.microsoft.com/office/powerpoint/2010/main" val="3960014178"/>
+      </p:ext>
+    </p:extLst>
+  </p:cSld>
+  <p:clrMapOvr>
+    <a:masterClrMapping/>
+  </p:clrMapOvr>
+</p:sld>
+</file>
+
+<file path=ppt/slides/slide16.xml><?xml version="1.0" encoding="utf-8"?>
+<p:sld xmlns:a="http://schemas.openxmlformats.org/drawingml/2006/main" xmlns:r="http://schemas.openxmlformats.org/officeDocument/2006/relationships" xmlns:p="http://schemas.openxmlformats.org/presentationml/2006/main">
+  <p:cSld>
+    <p:spTree>
+      <p:nvGrpSpPr>
+        <p:cNvPr id="1" name=""/>
+        <p:cNvGrpSpPr/>
+        <p:nvPr/>
+      </p:nvGrpSpPr>
+      <p:grpSpPr>
+        <a:xfrm>
+          <a:off x="0" y="0"/>
+          <a:ext cx="0" cy="0"/>
+          <a:chOff x="0" y="0"/>
+          <a:chExt cx="0" cy="0"/>
+        </a:xfrm>
+      </p:grpSpPr>
+      <p:sp>
+        <p:nvSpPr>
+          <p:cNvPr id="2" name="Title 1">
+            <a:extLst>
+              <a:ext uri="{FF2B5EF4-FFF2-40B4-BE49-F238E27FC236}">
+                <a16:creationId xmlns:a16="http://schemas.microsoft.com/office/drawing/2014/main" id="{3C0769D1-2A7E-4776-A1CD-069DCC49399D}"/>
+              </a:ext>
+            </a:extLst>
+          </p:cNvPr>
+          <p:cNvSpPr>
+            <a:spLocks noGrp="1"/>
+          </p:cNvSpPr>
+          <p:nvPr>
+            <p:ph type="title"/>
+          </p:nvPr>
+        </p:nvSpPr>
+        <p:spPr/>
+        <p:txBody>
+          <a:bodyPr/>
+          <a:lstStyle/>
+          <a:p>
+            <a:r>
+              <a:rPr lang="en-US" dirty="0"/>
+              <a:t>Practice (10 mins)</a:t>
+            </a:r>
+          </a:p>
+        </p:txBody>
+      </p:sp>
+      <p:sp>
+        <p:nvSpPr>
+          <p:cNvPr id="3" name="Content Placeholder 2">
+            <a:extLst>
+              <a:ext uri="{FF2B5EF4-FFF2-40B4-BE49-F238E27FC236}">
+                <a16:creationId xmlns:a16="http://schemas.microsoft.com/office/drawing/2014/main" id="{A69EE79D-BB8E-47F4-AFE6-0600BC320496}"/>
+              </a:ext>
+            </a:extLst>
+          </p:cNvPr>
+          <p:cNvSpPr>
+            <a:spLocks noGrp="1"/>
+          </p:cNvSpPr>
+          <p:nvPr>
+            <p:ph idx="1"/>
+          </p:nvPr>
+        </p:nvSpPr>
+        <p:spPr/>
+        <p:txBody>
+          <a:bodyPr/>
+          <a:lstStyle/>
+          <a:p>
+            <a:r>
+              <a:rPr lang="en-US" dirty="0"/>
+              <a:t>Write a subquery that finds the </a:t>
+            </a:r>
+            <a:r>
+              <a:rPr lang="en-US" dirty="0" err="1"/>
+              <a:t>film_id</a:t>
+            </a:r>
+            <a:r>
+              <a:rPr lang="en-US" dirty="0"/>
+              <a:t>, title, and </a:t>
+            </a:r>
+            <a:r>
+              <a:rPr lang="en-US" dirty="0" err="1"/>
+              <a:t>replacement_cost</a:t>
+            </a:r>
+            <a:r>
+              <a:rPr lang="en-US" dirty="0"/>
+              <a:t> for reach film where the </a:t>
+            </a:r>
+            <a:r>
+              <a:rPr lang="en-US" dirty="0" err="1"/>
+              <a:t>replacement_cost</a:t>
+            </a:r>
+            <a:r>
+              <a:rPr lang="en-US" dirty="0"/>
+              <a:t> is greater than the average. </a:t>
+            </a:r>
+          </a:p>
+          <a:p>
+            <a:endParaRPr lang="en-US" dirty="0"/>
+          </a:p>
+        </p:txBody>
+      </p:sp>
+    </p:spTree>
+    <p:extLst>
+      <p:ext uri="{BB962C8B-B14F-4D97-AF65-F5344CB8AC3E}">
+        <p14:creationId xmlns:p14="http://schemas.microsoft.com/office/powerpoint/2010/main" val="1658532722"/>
+      </p:ext>
+    </p:extLst>
+  </p:cSld>
+  <p:clrMapOvr>
+    <a:masterClrMapping/>
+  </p:clrMapOvr>
+</p:sld>
+</file>
+
+<file path=ppt/slides/slide17.xml><?xml version="1.0" encoding="utf-8"?>
+<p:sld xmlns:a="http://schemas.openxmlformats.org/drawingml/2006/main" xmlns:r="http://schemas.openxmlformats.org/officeDocument/2006/relationships" xmlns:p="http://schemas.openxmlformats.org/presentationml/2006/main">
+  <p:cSld>
+    <p:spTree>
+      <p:nvGrpSpPr>
+        <p:cNvPr id="1" name=""/>
+        <p:cNvGrpSpPr/>
+        <p:nvPr/>
+      </p:nvGrpSpPr>
+      <p:grpSpPr>
+        <a:xfrm>
+          <a:off x="0" y="0"/>
+          <a:ext cx="0" cy="0"/>
+          <a:chOff x="0" y="0"/>
+          <a:chExt cx="0" cy="0"/>
+        </a:xfrm>
+      </p:grpSpPr>
+      <p:sp>
+        <p:nvSpPr>
+          <p:cNvPr id="2" name="Title 1">
+            <a:extLst>
+              <a:ext uri="{FF2B5EF4-FFF2-40B4-BE49-F238E27FC236}">
+                <a16:creationId xmlns:a16="http://schemas.microsoft.com/office/drawing/2014/main" id="{1E4C2A9E-C0F4-4E0F-AFFE-27A0CF3625B5}"/>
+              </a:ext>
+            </a:extLst>
+          </p:cNvPr>
+          <p:cNvSpPr>
+            <a:spLocks noGrp="1"/>
+          </p:cNvSpPr>
+          <p:nvPr>
+            <p:ph type="title"/>
+          </p:nvPr>
+        </p:nvSpPr>
+        <p:spPr/>
+        <p:txBody>
+          <a:bodyPr/>
+          <a:lstStyle/>
+          <a:p>
+            <a:r>
+              <a:rPr lang="en-US"/>
+              <a:t>Week 7 </a:t>
+            </a:r>
+            <a:r>
+              <a:rPr lang="en-US" dirty="0"/>
+              <a:t>Group Exercise</a:t>
+            </a:r>
+          </a:p>
+        </p:txBody>
+      </p:sp>
+      <p:sp>
+        <p:nvSpPr>
+          <p:cNvPr id="3" name="Content Placeholder 2">
+            <a:extLst>
+              <a:ext uri="{FF2B5EF4-FFF2-40B4-BE49-F238E27FC236}">
+                <a16:creationId xmlns:a16="http://schemas.microsoft.com/office/drawing/2014/main" id="{D327E97E-AE1B-400B-A18F-C9C7C854DCEB}"/>
+              </a:ext>
+            </a:extLst>
+          </p:cNvPr>
+          <p:cNvSpPr>
+            <a:spLocks noGrp="1"/>
+          </p:cNvSpPr>
+          <p:nvPr>
+            <p:ph idx="1"/>
+          </p:nvPr>
+        </p:nvSpPr>
+        <p:spPr/>
+        <p:txBody>
+          <a:bodyPr vert="horz" lIns="91440" tIns="45720" rIns="91440" bIns="45720" rtlCol="0" anchor="t">
+            <a:normAutofit/>
+          </a:bodyPr>
+          <a:lstStyle/>
+          <a:p>
+            <a:r>
+              <a:rPr lang="en-US" spc="0" dirty="0"/>
+              <a:t>Once you finish and have submitted your exercise properly, please feel free to go back to any previous </a:t>
+            </a:r>
+            <a:r>
+              <a:rPr lang="en-US" spc="0" dirty="0" err="1"/>
+              <a:t>homeworks</a:t>
+            </a:r>
+            <a:r>
+              <a:rPr lang="en-US" spc="0" dirty="0"/>
+              <a:t> and ask questions you have about them OR start working on next week’s assignment!</a:t>
+            </a:r>
+          </a:p>
+        </p:txBody>
+      </p:sp>
+    </p:spTree>
+    <p:extLst>
+      <p:ext uri="{BB962C8B-B14F-4D97-AF65-F5344CB8AC3E}">
+        <p14:creationId xmlns:p14="http://schemas.microsoft.com/office/powerpoint/2010/main" val="656484464"/>
+      </p:ext>
+    </p:extLst>
+  </p:cSld>
+  <p:clrMapOvr>
+    <a:masterClrMapping/>
+  </p:clrMapOvr>
+</p:sld>
+</file>
+
+<file path=ppt/slides/slide2.xml><?xml version="1.0" encoding="utf-8"?>
+<p:sld xmlns:a="http://schemas.openxmlformats.org/drawingml/2006/main" xmlns:r="http://schemas.openxmlformats.org/officeDocument/2006/relationships" xmlns:p="http://schemas.openxmlformats.org/presentationml/2006/main">
+  <p:cSld>
+    <p:spTree>
+      <p:nvGrpSpPr>
+        <p:cNvPr id="1" name=""/>
+        <p:cNvGrpSpPr/>
+        <p:nvPr/>
+      </p:nvGrpSpPr>
+      <p:grpSpPr>
+        <a:xfrm>
+          <a:off x="0" y="0"/>
+          <a:ext cx="0" cy="0"/>
+          <a:chOff x="0" y="0"/>
+          <a:chExt cx="0" cy="0"/>
+        </a:xfrm>
+      </p:grpSpPr>
+      <p:sp>
+        <p:nvSpPr>
+          <p:cNvPr id="2" name="Title 1">
+            <a:extLst>
+              <a:ext uri="{FF2B5EF4-FFF2-40B4-BE49-F238E27FC236}">
+                <a16:creationId xmlns:a16="http://schemas.microsoft.com/office/drawing/2014/main" id="{05D6C5DD-629A-487F-A7F5-924593CD7E48}"/>
+              </a:ext>
+            </a:extLst>
+          </p:cNvPr>
+          <p:cNvSpPr>
+            <a:spLocks noGrp="1"/>
+          </p:cNvSpPr>
+          <p:nvPr>
+            <p:ph type="title"/>
+          </p:nvPr>
+        </p:nvSpPr>
+        <p:spPr/>
+        <p:txBody>
+          <a:bodyPr/>
+          <a:lstStyle/>
+          <a:p>
+            <a:r>
+              <a:rPr lang="en-US" dirty="0"/>
+              <a:t>Warm-up	(10 minutes)</a:t>
+            </a:r>
+          </a:p>
+        </p:txBody>
+      </p:sp>
+      <p:sp>
+        <p:nvSpPr>
+          <p:cNvPr id="3" name="Content Placeholder 2">
+            <a:extLst>
+              <a:ext uri="{FF2B5EF4-FFF2-40B4-BE49-F238E27FC236}">
+                <a16:creationId xmlns:a16="http://schemas.microsoft.com/office/drawing/2014/main" id="{25D9BA3D-E1A8-448E-8CE9-5E85A7B8C4E1}"/>
+              </a:ext>
+            </a:extLst>
+          </p:cNvPr>
+          <p:cNvSpPr>
+            <a:spLocks noGrp="1"/>
+          </p:cNvSpPr>
+          <p:nvPr>
+            <p:ph idx="1"/>
+          </p:nvPr>
+        </p:nvSpPr>
+        <p:spPr>
+          <a:xfrm>
+            <a:off x="1261872" y="1717130"/>
+            <a:ext cx="8595360" cy="4351337"/>
+          </a:xfrm>
+        </p:spPr>
+        <p:txBody>
+          <a:bodyPr/>
+          <a:lstStyle/>
+          <a:p>
+            <a:r>
+              <a:rPr lang="en-US" dirty="0"/>
+              <a:t>What does ACID stand for and why is it so important for databases?</a:t>
+            </a:r>
+          </a:p>
+          <a:p>
+            <a:endParaRPr lang="en-US" dirty="0"/>
+          </a:p>
+          <a:p>
+            <a:endParaRPr lang="en-US" dirty="0"/>
+          </a:p>
+          <a:p>
+            <a:endParaRPr lang="en-US" dirty="0"/>
+          </a:p>
+          <a:p>
+            <a:endParaRPr lang="en-US" dirty="0"/>
+          </a:p>
+          <a:p>
+            <a:r>
+              <a:rPr lang="en-US" dirty="0"/>
+              <a:t>Create a table in the default </a:t>
+            </a:r>
+            <a:r>
+              <a:rPr lang="en-US" dirty="0" err="1"/>
+              <a:t>postgres</a:t>
+            </a:r>
+            <a:r>
+              <a:rPr lang="en-US" dirty="0"/>
+              <a:t> database (called “</a:t>
+            </a:r>
+            <a:r>
+              <a:rPr lang="en-US" dirty="0" err="1"/>
+              <a:t>postgres</a:t>
+            </a:r>
+            <a:r>
+              <a:rPr lang="en-US" dirty="0"/>
+              <a:t>”) called either “cats” or “dogs”. Include at least three columns in your create statement. Use </a:t>
+            </a:r>
+            <a:r>
+              <a:rPr lang="en-US" dirty="0">
+                <a:hlinkClick r:id="rId2"/>
+              </a:rPr>
+              <a:t>https://www.postgresql.org/docs/9.1/sql-createtable.html</a:t>
+            </a:r>
+            <a:r>
+              <a:rPr lang="en-US" dirty="0"/>
+              <a:t> to help you</a:t>
+            </a:r>
+          </a:p>
+        </p:txBody>
+      </p:sp>
+    </p:spTree>
+    <p:extLst>
+      <p:ext uri="{BB962C8B-B14F-4D97-AF65-F5344CB8AC3E}">
+        <p14:creationId xmlns:p14="http://schemas.microsoft.com/office/powerpoint/2010/main" val="188562136"/>
+      </p:ext>
+    </p:extLst>
+  </p:cSld>
+  <p:clrMapOvr>
+    <a:masterClrMapping/>
+  </p:clrMapOvr>
+</p:sld>
+</file>
+
+<file path=ppt/slides/slide3.xml><?xml version="1.0" encoding="utf-8"?>
+<p:sld xmlns:a="http://schemas.openxmlformats.org/drawingml/2006/main" xmlns:r="http://schemas.openxmlformats.org/officeDocument/2006/relationships" xmlns:p="http://schemas.openxmlformats.org/presentationml/2006/main">
+  <p:cSld>
+    <p:spTree>
+      <p:nvGrpSpPr>
+        <p:cNvPr id="1" name=""/>
+        <p:cNvGrpSpPr/>
+        <p:nvPr/>
+      </p:nvGrpSpPr>
+      <p:grpSpPr>
+        <a:xfrm>
+          <a:off x="0" y="0"/>
+          <a:ext cx="0" cy="0"/>
+          <a:chOff x="0" y="0"/>
+          <a:chExt cx="0" cy="0"/>
+        </a:xfrm>
+      </p:grpSpPr>
+      <p:sp>
+        <p:nvSpPr>
+          <p:cNvPr id="2" name="Title 1">
+            <a:extLst>
+              <a:ext uri="{FF2B5EF4-FFF2-40B4-BE49-F238E27FC236}">
+                <a16:creationId xmlns:a16="http://schemas.microsoft.com/office/drawing/2014/main" id="{4B6EB97C-9C9E-4774-B618-710FC677AD19}"/>
+              </a:ext>
+            </a:extLst>
+          </p:cNvPr>
+          <p:cNvSpPr>
+            <a:spLocks noGrp="1"/>
+          </p:cNvSpPr>
+          <p:nvPr>
+            <p:ph type="title"/>
+          </p:nvPr>
+        </p:nvSpPr>
+        <p:spPr>
+          <a:xfrm>
+            <a:off x="80344" y="40412"/>
+            <a:ext cx="9692640" cy="769046"/>
+          </a:xfrm>
+        </p:spPr>
+        <p:txBody>
+          <a:bodyPr/>
+          <a:lstStyle/>
+          <a:p>
+            <a:r>
+              <a:rPr lang="en-US" dirty="0"/>
+              <a:t>Today's Activities</a:t>
+            </a:r>
+          </a:p>
+        </p:txBody>
+      </p:sp>
+      <p:sp>
+        <p:nvSpPr>
+          <p:cNvPr id="3" name="Content Placeholder 2">
+            <a:extLst>
+              <a:ext uri="{FF2B5EF4-FFF2-40B4-BE49-F238E27FC236}">
+                <a16:creationId xmlns:a16="http://schemas.microsoft.com/office/drawing/2014/main" id="{A94ED92E-9B1F-48CA-A2B2-FF65221C2F5D}"/>
+              </a:ext>
+            </a:extLst>
+          </p:cNvPr>
+          <p:cNvSpPr>
+            <a:spLocks noGrp="1"/>
+          </p:cNvSpPr>
+          <p:nvPr>
+            <p:ph idx="1"/>
+          </p:nvPr>
+        </p:nvSpPr>
+        <p:spPr>
+          <a:xfrm>
+            <a:off x="696793" y="981182"/>
+            <a:ext cx="9400168" cy="5507179"/>
+          </a:xfrm>
+        </p:spPr>
+        <p:txBody>
+          <a:bodyPr vert="horz" lIns="91440" tIns="45720" rIns="91440" bIns="45720" rtlCol="0" anchor="t">
+            <a:normAutofit/>
+          </a:bodyPr>
+          <a:lstStyle/>
+          <a:p>
+            <a:r>
+              <a:rPr lang="en-US" dirty="0"/>
+              <a:t>Warmup (15 mins)</a:t>
+            </a:r>
+          </a:p>
+          <a:p>
+            <a:r>
+              <a:rPr lang="en-US" dirty="0"/>
+              <a:t>Homework Answers/Q&amp;A (25 mins)</a:t>
+            </a:r>
+          </a:p>
+          <a:p>
+            <a:r>
+              <a:rPr lang="en-US" dirty="0"/>
+              <a:t>Data Modeling Basics (50 mins)</a:t>
+            </a:r>
+          </a:p>
+          <a:p>
+            <a:r>
+              <a:rPr lang="en-US" dirty="0"/>
+              <a:t>Break (15 mins)</a:t>
+            </a:r>
+          </a:p>
+          <a:p>
+            <a:r>
+              <a:rPr lang="en-US" dirty="0"/>
+              <a:t>Subqueries and Joins (30 mins)</a:t>
+            </a:r>
+          </a:p>
+          <a:p>
+            <a:r>
+              <a:rPr lang="en-US" dirty="0"/>
+              <a:t>Group Exercise (45 mins)</a:t>
+            </a:r>
+          </a:p>
+          <a:p>
+            <a:endParaRPr lang="en-US" dirty="0"/>
+          </a:p>
+        </p:txBody>
+      </p:sp>
+    </p:spTree>
+    <p:extLst>
+      <p:ext uri="{BB962C8B-B14F-4D97-AF65-F5344CB8AC3E}">
+        <p14:creationId xmlns:p14="http://schemas.microsoft.com/office/powerpoint/2010/main" val="2975521112"/>
+      </p:ext>
+    </p:extLst>
+  </p:cSld>
+  <p:clrMapOvr>
+    <a:masterClrMapping/>
+  </p:clrMapOvr>
+</p:sld>
+</file>
+
+<file path=ppt/slides/slide4.xml><?xml version="1.0" encoding="utf-8"?>
+<p:sld xmlns:a="http://schemas.openxmlformats.org/drawingml/2006/main" xmlns:r="http://schemas.openxmlformats.org/officeDocument/2006/relationships" xmlns:p="http://schemas.openxmlformats.org/presentationml/2006/main">
+  <p:cSld>
+    <p:spTree>
+      <p:nvGrpSpPr>
+        <p:cNvPr id="1" name=""/>
+        <p:cNvGrpSpPr/>
+        <p:nvPr/>
+      </p:nvGrpSpPr>
+      <p:grpSpPr>
+        <a:xfrm>
+          <a:off x="0" y="0"/>
+          <a:ext cx="0" cy="0"/>
+          <a:chOff x="0" y="0"/>
+          <a:chExt cx="0" cy="0"/>
+        </a:xfrm>
+      </p:grpSpPr>
+      <p:sp>
+        <p:nvSpPr>
+          <p:cNvPr id="2" name="Title 1">
+            <a:extLst>
+              <a:ext uri="{FF2B5EF4-FFF2-40B4-BE49-F238E27FC236}">
+                <a16:creationId xmlns:a16="http://schemas.microsoft.com/office/drawing/2014/main" id="{F6B7C306-19F1-4155-8560-64A0628655D7}"/>
+              </a:ext>
+            </a:extLst>
+          </p:cNvPr>
+          <p:cNvSpPr>
+            <a:spLocks noGrp="1"/>
+          </p:cNvSpPr>
+          <p:nvPr>
+            <p:ph type="title"/>
+          </p:nvPr>
+        </p:nvSpPr>
+        <p:spPr/>
+        <p:txBody>
+          <a:bodyPr/>
+          <a:lstStyle/>
+          <a:p>
+            <a:r>
+              <a:rPr lang="en-US" dirty="0"/>
+              <a:t>Class Reminders</a:t>
+            </a:r>
+          </a:p>
+        </p:txBody>
+      </p:sp>
+      <p:sp>
+        <p:nvSpPr>
+          <p:cNvPr id="3" name="Content Placeholder 2">
+            <a:extLst>
+              <a:ext uri="{FF2B5EF4-FFF2-40B4-BE49-F238E27FC236}">
+                <a16:creationId xmlns:a16="http://schemas.microsoft.com/office/drawing/2014/main" id="{7D5E422A-199A-4808-BFA5-2D9C37C0F89B}"/>
+              </a:ext>
+            </a:extLst>
+          </p:cNvPr>
+          <p:cNvSpPr>
+            <a:spLocks noGrp="1"/>
+          </p:cNvSpPr>
+          <p:nvPr>
+            <p:ph idx="1"/>
+          </p:nvPr>
+        </p:nvSpPr>
+        <p:spPr/>
+        <p:txBody>
+          <a:bodyPr/>
+          <a:lstStyle/>
+          <a:p>
+            <a:r>
+              <a:rPr lang="en-US" dirty="0"/>
+              <a:t>At each checkpoint, your in-class assignments grade needs to average &gt;= 70%</a:t>
+            </a:r>
+          </a:p>
+          <a:p>
+            <a:r>
+              <a:rPr lang="en-US" dirty="0"/>
+              <a:t>I will not be grading in-class assignments that are more than a week late.</a:t>
+            </a:r>
+          </a:p>
+          <a:p>
+            <a:r>
+              <a:rPr lang="en-US" dirty="0"/>
+              <a:t>You will now start to lose points if assignments are more than 2 days late. This starts with the week 6 SQL homework (due today)</a:t>
+            </a:r>
+          </a:p>
+          <a:p>
+            <a:pPr lvl="1"/>
+            <a:r>
+              <a:rPr lang="en-US" dirty="0"/>
+              <a:t>So, if you turn it in after Friday, you lose one point per day.</a:t>
+            </a:r>
+          </a:p>
+          <a:p>
+            <a:r>
+              <a:rPr lang="en-US" dirty="0"/>
+              <a:t>ALL corrections for past assignments (first 5 HW and in-class assignments) need to be in by this Friday in order for us to review them. </a:t>
+            </a:r>
+          </a:p>
+          <a:p>
+            <a:r>
+              <a:rPr lang="en-US" dirty="0"/>
+              <a:t>You are only allowed to miss one assignment in the whole course, so choose wisely. </a:t>
+            </a:r>
+          </a:p>
+          <a:p>
+            <a:pPr lvl="1"/>
+            <a:r>
+              <a:rPr lang="en-US" dirty="0"/>
+              <a:t>Getting below 70% on an assignment counts as missing it. </a:t>
+            </a:r>
+          </a:p>
+        </p:txBody>
+      </p:sp>
+    </p:spTree>
+    <p:extLst>
+      <p:ext uri="{BB962C8B-B14F-4D97-AF65-F5344CB8AC3E}">
+        <p14:creationId xmlns:p14="http://schemas.microsoft.com/office/powerpoint/2010/main" val="3501738748"/>
+      </p:ext>
+    </p:extLst>
+  </p:cSld>
+  <p:clrMapOvr>
+    <a:masterClrMapping/>
+  </p:clrMapOvr>
+</p:sld>
+</file>
+
+<file path=ppt/slides/slide5.xml><?xml version="1.0" encoding="utf-8"?>
+<p:sld xmlns:a="http://schemas.openxmlformats.org/drawingml/2006/main" xmlns:r="http://schemas.openxmlformats.org/officeDocument/2006/relationships" xmlns:p="http://schemas.openxmlformats.org/presentationml/2006/main">
+  <p:cSld>
+    <p:bg>
+      <p:bgPr>
+        <a:solidFill>
+          <a:schemeClr val="bg1"/>
+        </a:solidFill>
+        <a:effectLst/>
+      </p:bgPr>
+    </p:bg>
+    <p:spTree>
+      <p:nvGrpSpPr>
+        <p:cNvPr id="1" name=""/>
+        <p:cNvGrpSpPr/>
+        <p:nvPr/>
+      </p:nvGrpSpPr>
+      <p:grpSpPr>
+        <a:xfrm>
+          <a:off x="0" y="0"/>
+          <a:ext cx="0" cy="0"/>
+          <a:chOff x="0" y="0"/>
+          <a:chExt cx="0" cy="0"/>
+        </a:xfrm>
+      </p:grpSpPr>
+      <p:sp>
+        <p:nvSpPr>
+          <p:cNvPr id="9" name="Rectangle 8">
+            <a:extLst>
+              <a:ext uri="{FF2B5EF4-FFF2-40B4-BE49-F238E27FC236}">
+                <a16:creationId xmlns:a16="http://schemas.microsoft.com/office/drawing/2014/main" id="{F4ADA65C-BA4C-42BE-84D1-1AF286B7F967}"/>
+              </a:ext>
+              <a:ext uri="{C183D7F6-B498-43B3-948B-1728B52AA6E4}">
+                <adec:decorative xmlns:adec="http://schemas.microsoft.com/office/drawing/2017/decorative" val="1"/>
+              </a:ext>
+            </a:extLst>
+          </p:cNvPr>
+          <p:cNvSpPr>
+            <a:spLocks noGrp="1" noRot="1" noChangeAspect="1" noMove="1" noResize="1" noEditPoints="1" noAdjustHandles="1" noChangeArrowheads="1" noChangeShapeType="1" noTextEdit="1"/>
+          </p:cNvSpPr>
+          <p:nvPr>
+            <p:extLst>
+              <p:ext uri="{386F3935-93C4-4BCD-93E2-E3B085C9AB24}">
+                <p16:designElem xmlns:p16="http://schemas.microsoft.com/office/powerpoint/2015/main" val="1"/>
+              </p:ext>
+            </p:extLst>
+          </p:nvPr>
+        </p:nvSpPr>
+        <p:spPr>
+          <a:xfrm>
+            <a:off x="11292840" y="0"/>
+            <a:ext cx="914400" cy="6858000"/>
+          </a:xfrm>
+          <a:prstGeom prst="rect">
+            <a:avLst/>
+          </a:prstGeom>
+          <a:solidFill>
+            <a:srgbClr val="303030"/>
+          </a:solidFill>
+          <a:ln>
+            <a:noFill/>
+          </a:ln>
+        </p:spPr>
+        <p:style>
+          <a:lnRef idx="2">
+            <a:schemeClr val="accent1">
+              <a:shade val="50000"/>
+            </a:schemeClr>
+          </a:lnRef>
+          <a:fillRef idx="1">
+            <a:schemeClr val="accent1"/>
+          </a:fillRef>
+          <a:effectRef idx="0">
+            <a:schemeClr val="accent1"/>
+          </a:effectRef>
+          <a:fontRef idx="minor">
+            <a:schemeClr val="lt1"/>
+          </a:fontRef>
+        </p:style>
+      </p:sp>
+      <p:sp>
+        <p:nvSpPr>
+          <p:cNvPr id="11" name="Rectangle 10">
+            <a:extLst>
+              <a:ext uri="{FF2B5EF4-FFF2-40B4-BE49-F238E27FC236}">
+                <a16:creationId xmlns:a16="http://schemas.microsoft.com/office/drawing/2014/main" id="{C42F5EBA-F777-4A1C-8E30-62DA7F55AE24}"/>
+              </a:ext>
+              <a:ext uri="{C183D7F6-B498-43B3-948B-1728B52AA6E4}">
+                <adec:decorative xmlns:adec="http://schemas.microsoft.com/office/drawing/2017/decorative" val="1"/>
+              </a:ext>
+            </a:extLst>
+          </p:cNvPr>
+          <p:cNvSpPr>
+            <a:spLocks noGrp="1" noRot="1" noChangeAspect="1" noMove="1" noResize="1" noEditPoints="1" noAdjustHandles="1" noChangeArrowheads="1" noChangeShapeType="1" noTextEdit="1"/>
+          </p:cNvSpPr>
+          <p:nvPr>
+            <p:extLst>
+              <p:ext uri="{386F3935-93C4-4BCD-93E2-E3B085C9AB24}">
+                <p16:designElem xmlns:p16="http://schemas.microsoft.com/office/powerpoint/2015/main" val="1"/>
+              </p:ext>
+            </p:extLst>
+          </p:nvPr>
+        </p:nvSpPr>
+        <p:spPr>
+          <a:xfrm>
+            <a:off x="0" y="0"/>
+            <a:ext cx="457200" cy="6858000"/>
+          </a:xfrm>
+          <a:prstGeom prst="rect">
+            <a:avLst/>
+          </a:prstGeom>
+          <a:solidFill>
+            <a:srgbClr val="303030"/>
+          </a:solidFill>
+          <a:ln>
+            <a:noFill/>
+          </a:ln>
+        </p:spPr>
+        <p:style>
+          <a:lnRef idx="2">
+            <a:schemeClr val="accent1">
+              <a:shade val="50000"/>
+            </a:schemeClr>
+          </a:lnRef>
+          <a:fillRef idx="1">
+            <a:schemeClr val="accent1"/>
+          </a:fillRef>
+          <a:effectRef idx="0">
+            <a:schemeClr val="accent1"/>
+          </a:effectRef>
+          <a:fontRef idx="minor">
+            <a:schemeClr val="lt1"/>
+          </a:fontRef>
+        </p:style>
+      </p:sp>
+      <p:sp>
+        <p:nvSpPr>
+          <p:cNvPr id="2" name="Title 1">
+            <a:extLst>
+              <a:ext uri="{FF2B5EF4-FFF2-40B4-BE49-F238E27FC236}">
+                <a16:creationId xmlns:a16="http://schemas.microsoft.com/office/drawing/2014/main" id="{5FBE1196-DEA1-4247-A83C-A24D341AA2F4}"/>
+              </a:ext>
+            </a:extLst>
+          </p:cNvPr>
+          <p:cNvSpPr>
+            <a:spLocks noGrp="1"/>
+          </p:cNvSpPr>
+          <p:nvPr>
+            <p:ph type="title"/>
+          </p:nvPr>
+        </p:nvSpPr>
+        <p:spPr>
+          <a:xfrm>
+            <a:off x="8180438" y="758952"/>
+            <a:ext cx="2853005" cy="4041648"/>
+          </a:xfrm>
+        </p:spPr>
+        <p:txBody>
+          <a:bodyPr vert="horz" lIns="91440" tIns="45720" rIns="91440" bIns="45720" rtlCol="0" anchor="b">
+            <a:normAutofit/>
+          </a:bodyPr>
+          <a:lstStyle/>
+          <a:p>
+            <a:pPr>
+              <a:lnSpc>
+                <a:spcPct val="85000"/>
+              </a:lnSpc>
+            </a:pPr>
+            <a:r>
+              <a:rPr lang="en-US" sz="4700" dirty="0"/>
+              <a:t>In what ways is SQL different from python?</a:t>
+            </a:r>
+          </a:p>
+        </p:txBody>
+      </p:sp>
+      <p:pic>
+        <p:nvPicPr>
+          <p:cNvPr id="5" name="Picture 4" descr="Computer script on a screen">
+            <a:extLst>
+              <a:ext uri="{FF2B5EF4-FFF2-40B4-BE49-F238E27FC236}">
+                <a16:creationId xmlns:a16="http://schemas.microsoft.com/office/drawing/2014/main" id="{EF8550D2-4C2A-4408-B1AC-C8627160A4AF}"/>
+              </a:ext>
+            </a:extLst>
+          </p:cNvPr>
+          <p:cNvPicPr>
+            <a:picLocks noChangeAspect="1"/>
+          </p:cNvPicPr>
+          <p:nvPr/>
+        </p:nvPicPr>
+        <p:blipFill rotWithShape="1">
+          <a:blip r:embed="rId2"/>
+          <a:srcRect r="30713" b="-1"/>
+          <a:stretch/>
+        </p:blipFill>
+        <p:spPr>
+          <a:xfrm>
+            <a:off x="442453" y="10"/>
+            <a:ext cx="7118554" cy="6857990"/>
+          </a:xfrm>
+          <a:prstGeom prst="rect">
+            <a:avLst/>
+          </a:prstGeom>
+        </p:spPr>
+      </p:pic>
+    </p:spTree>
+    <p:extLst>
+      <p:ext uri="{BB962C8B-B14F-4D97-AF65-F5344CB8AC3E}">
+        <p14:creationId xmlns:p14="http://schemas.microsoft.com/office/powerpoint/2010/main" val="2925978185"/>
+      </p:ext>
+    </p:extLst>
+  </p:cSld>
+  <p:clrMapOvr>
+    <a:masterClrMapping/>
+  </p:clrMapOvr>
+</p:sld>
+</file>
+
+<file path=ppt/slides/slide6.xml><?xml version="1.0" encoding="utf-8"?>
+<p:sld xmlns:a="http://schemas.openxmlformats.org/drawingml/2006/main" xmlns:r="http://schemas.openxmlformats.org/officeDocument/2006/relationships" xmlns:p="http://schemas.openxmlformats.org/presentationml/2006/main">
+  <p:cSld>
+    <p:spTree>
+      <p:nvGrpSpPr>
+        <p:cNvPr id="1" name=""/>
+        <p:cNvGrpSpPr/>
+        <p:nvPr/>
+      </p:nvGrpSpPr>
+      <p:grpSpPr>
+        <a:xfrm>
+          <a:off x="0" y="0"/>
+          <a:ext cx="0" cy="0"/>
+          <a:chOff x="0" y="0"/>
+          <a:chExt cx="0" cy="0"/>
+        </a:xfrm>
+      </p:grpSpPr>
+      <p:sp>
+        <p:nvSpPr>
+          <p:cNvPr id="2" name="Title 1">
+            <a:extLst>
+              <a:ext uri="{FF2B5EF4-FFF2-40B4-BE49-F238E27FC236}">
+                <a16:creationId xmlns:a16="http://schemas.microsoft.com/office/drawing/2014/main" id="{BE3D1A1B-D13D-4D77-8B55-4A6A706538CD}"/>
+              </a:ext>
+            </a:extLst>
+          </p:cNvPr>
+          <p:cNvSpPr>
+            <a:spLocks noGrp="1"/>
+          </p:cNvSpPr>
+          <p:nvPr>
+            <p:ph type="title"/>
+          </p:nvPr>
+        </p:nvSpPr>
+        <p:spPr>
+          <a:xfrm>
+            <a:off x="953647" y="-550352"/>
+            <a:ext cx="9692640" cy="1325562"/>
+          </a:xfrm>
+        </p:spPr>
+        <p:txBody>
+          <a:bodyPr/>
+          <a:lstStyle/>
+          <a:p>
+            <a:r>
+              <a:rPr lang="en-US" dirty="0"/>
+              <a:t>Homework Answers (25 mins)</a:t>
+            </a:r>
+          </a:p>
+        </p:txBody>
+      </p:sp>
+      <p:sp>
+        <p:nvSpPr>
+          <p:cNvPr id="3" name="Content Placeholder 2">
+            <a:extLst>
+              <a:ext uri="{FF2B5EF4-FFF2-40B4-BE49-F238E27FC236}">
+                <a16:creationId xmlns:a16="http://schemas.microsoft.com/office/drawing/2014/main" id="{1C31657E-A052-466D-9218-FD671392B5A7}"/>
+              </a:ext>
+            </a:extLst>
+          </p:cNvPr>
+          <p:cNvSpPr>
+            <a:spLocks noGrp="1"/>
+          </p:cNvSpPr>
+          <p:nvPr>
+            <p:ph idx="1"/>
+          </p:nvPr>
+        </p:nvSpPr>
+        <p:spPr>
+          <a:xfrm>
+            <a:off x="1210501" y="1503452"/>
+            <a:ext cx="8595360" cy="4351337"/>
+          </a:xfrm>
+        </p:spPr>
+        <p:txBody>
+          <a:bodyPr vert="horz" lIns="91440" tIns="45720" rIns="91440" bIns="45720" rtlCol="0" anchor="t">
+            <a:normAutofit/>
+          </a:bodyPr>
+          <a:lstStyle/>
+          <a:p>
+            <a:r>
+              <a:rPr lang="en-US" dirty="0"/>
+              <a:t>To save some time I will discuss a subset of answers.</a:t>
+            </a:r>
+          </a:p>
+          <a:p>
+            <a:r>
+              <a:rPr lang="en-US" dirty="0"/>
+              <a:t>Voluntarily slack answers to the #datascience channel</a:t>
+            </a:r>
+          </a:p>
+          <a:p>
+            <a:r>
+              <a:rPr lang="en-US" dirty="0"/>
+              <a:t>Don't be shy!</a:t>
+            </a:r>
+          </a:p>
+        </p:txBody>
+      </p:sp>
+    </p:spTree>
+    <p:extLst>
+      <p:ext uri="{BB962C8B-B14F-4D97-AF65-F5344CB8AC3E}">
+        <p14:creationId xmlns:p14="http://schemas.microsoft.com/office/powerpoint/2010/main" val="2679292092"/>
+      </p:ext>
+    </p:extLst>
+  </p:cSld>
+  <p:clrMapOvr>
+    <a:masterClrMapping/>
+  </p:clrMapOvr>
+</p:sld>
+</file>
+
+<file path=ppt/slides/slide7.xml><?xml version="1.0" encoding="utf-8"?>
+<p:sld xmlns:a="http://schemas.openxmlformats.org/drawingml/2006/main" xmlns:r="http://schemas.openxmlformats.org/officeDocument/2006/relationships" xmlns:p="http://schemas.openxmlformats.org/presentationml/2006/main">
+  <p:cSld>
+    <p:spTree>
+      <p:nvGrpSpPr>
+        <p:cNvPr id="1" name=""/>
+        <p:cNvGrpSpPr/>
+        <p:nvPr/>
+      </p:nvGrpSpPr>
+      <p:grpSpPr>
+        <a:xfrm>
+          <a:off x="0" y="0"/>
+          <a:ext cx="0" cy="0"/>
+          <a:chOff x="0" y="0"/>
+          <a:chExt cx="0" cy="0"/>
+        </a:xfrm>
+      </p:grpSpPr>
+      <p:pic>
+        <p:nvPicPr>
+          <p:cNvPr id="5" name="Content Placeholder 4" descr="Diagram&#10;&#10;Description automatically generated">
+            <a:extLst>
+              <a:ext uri="{FF2B5EF4-FFF2-40B4-BE49-F238E27FC236}">
+                <a16:creationId xmlns:a16="http://schemas.microsoft.com/office/drawing/2014/main" id="{30151D0C-AB65-48B6-AD1F-C1F2EA803AA7}"/>
+              </a:ext>
+            </a:extLst>
+          </p:cNvPr>
+          <p:cNvPicPr>
+            <a:picLocks noGrp="1" noChangeAspect="1"/>
+          </p:cNvPicPr>
+          <p:nvPr>
+            <p:ph idx="1"/>
+          </p:nvPr>
+        </p:nvPicPr>
+        <p:blipFill>
+          <a:blip r:embed="rId2">
+            <a:extLst>
+              <a:ext uri="{28A0092B-C50C-407E-A947-70E740481C1C}">
+                <a14:useLocalDpi xmlns:a14="http://schemas.microsoft.com/office/drawing/2010/main" val="0"/>
+              </a:ext>
+            </a:extLst>
+          </a:blip>
+          <a:stretch>
+            <a:fillRect/>
+          </a:stretch>
+        </p:blipFill>
+        <p:spPr>
+          <a:xfrm>
+            <a:off x="1531089" y="108031"/>
+            <a:ext cx="8442251" cy="6641937"/>
+          </a:xfrm>
+        </p:spPr>
+      </p:pic>
+    </p:spTree>
+    <p:extLst>
+      <p:ext uri="{BB962C8B-B14F-4D97-AF65-F5344CB8AC3E}">
+        <p14:creationId xmlns:p14="http://schemas.microsoft.com/office/powerpoint/2010/main" val="1836824519"/>
+      </p:ext>
+    </p:extLst>
+  </p:cSld>
+  <p:clrMapOvr>
+    <a:masterClrMapping/>
+  </p:clrMapOvr>
+</p:sld>
+</file>
+
+<file path=ppt/slides/slide8.xml><?xml version="1.0" encoding="utf-8"?>
+<p:sld xmlns:a="http://schemas.openxmlformats.org/drawingml/2006/main" xmlns:r="http://schemas.openxmlformats.org/officeDocument/2006/relationships" xmlns:p="http://schemas.openxmlformats.org/presentationml/2006/main">
+  <p:cSld>
+    <p:bg>
+      <p:bgPr>
+        <a:gradFill rotWithShape="1">
+          <a:gsLst>
+            <a:gs pos="0">
+              <a:schemeClr val="bg1">
+                <a:tint val="94000"/>
+                <a:shade val="98000"/>
+                <a:satMod val="130000"/>
+                <a:lumMod val="102000"/>
+              </a:schemeClr>
+            </a:gs>
+            <a:gs pos="100000">
+              <a:schemeClr val="bg1">
+                <a:tint val="98000"/>
+                <a:shade val="78000"/>
+                <a:satMod val="140000"/>
+              </a:schemeClr>
+            </a:gs>
+          </a:gsLst>
+          <a:path path="circle">
+            <a:fillToRect l="100000" t="100000" r="100000" b="100000"/>
+          </a:path>
+        </a:gradFill>
+        <a:effectLst/>
+      </p:bgPr>
+    </p:bg>
+    <p:spTree>
+      <p:nvGrpSpPr>
+        <p:cNvPr id="1" name=""/>
+        <p:cNvGrpSpPr/>
+        <p:nvPr/>
+      </p:nvGrpSpPr>
+      <p:grpSpPr>
+        <a:xfrm>
+          <a:off x="0" y="0"/>
+          <a:ext cx="0" cy="0"/>
+          <a:chOff x="0" y="0"/>
+          <a:chExt cx="0" cy="0"/>
+        </a:xfrm>
+      </p:grpSpPr>
+      <p:sp>
+        <p:nvSpPr>
+          <p:cNvPr id="9" name="Rectangle 8">
+            <a:extLst>
+              <a:ext uri="{FF2B5EF4-FFF2-40B4-BE49-F238E27FC236}">
+                <a16:creationId xmlns:a16="http://schemas.microsoft.com/office/drawing/2014/main" id="{100A9A80-E8FE-48ED-A56B-95801B22181A}"/>
+              </a:ext>
+              <a:ext uri="{C183D7F6-B498-43B3-948B-1728B52AA6E4}">
+                <adec:decorative xmlns:adec="http://schemas.microsoft.com/office/drawing/2017/decorative" val="1"/>
+              </a:ext>
+            </a:extLst>
+          </p:cNvPr>
+          <p:cNvSpPr>
+            <a:spLocks noGrp="1" noRot="1" noChangeAspect="1" noMove="1" noResize="1" noEditPoints="1" noAdjustHandles="1" noChangeArrowheads="1" noChangeShapeType="1" noTextEdit="1"/>
+          </p:cNvSpPr>
+          <p:nvPr>
+            <p:extLst>
+              <p:ext uri="{386F3935-93C4-4BCD-93E2-E3B085C9AB24}">
+                <p16:designElem xmlns:p16="http://schemas.microsoft.com/office/powerpoint/2015/main" val="1"/>
+              </p:ext>
+            </p:extLst>
+          </p:nvPr>
+        </p:nvSpPr>
+        <p:spPr>
+          <a:xfrm>
+            <a:off x="11292840" y="0"/>
+            <a:ext cx="914400" cy="6858000"/>
+          </a:xfrm>
+          <a:prstGeom prst="rect">
+            <a:avLst/>
+          </a:prstGeom>
+          <a:solidFill>
+            <a:srgbClr val="303030"/>
+          </a:solidFill>
+          <a:ln>
+            <a:noFill/>
+          </a:ln>
+        </p:spPr>
+        <p:style>
+          <a:lnRef idx="2">
+            <a:schemeClr val="accent1">
+              <a:shade val="50000"/>
+            </a:schemeClr>
+          </a:lnRef>
+          <a:fillRef idx="1">
+            <a:schemeClr val="accent1"/>
+          </a:fillRef>
+          <a:effectRef idx="0">
+            <a:schemeClr val="accent1"/>
+          </a:effectRef>
+          <a:fontRef idx="minor">
+            <a:schemeClr val="lt1"/>
+          </a:fontRef>
+        </p:style>
+      </p:sp>
+      <p:sp>
+        <p:nvSpPr>
+          <p:cNvPr id="11" name="Rectangle 10">
+            <a:extLst>
+              <a:ext uri="{FF2B5EF4-FFF2-40B4-BE49-F238E27FC236}">
+                <a16:creationId xmlns:a16="http://schemas.microsoft.com/office/drawing/2014/main" id="{E85544B9-05BC-4819-A434-90EE49FAF6C0}"/>
+              </a:ext>
+              <a:ext uri="{C183D7F6-B498-43B3-948B-1728B52AA6E4}">
+                <adec:decorative xmlns:adec="http://schemas.microsoft.com/office/drawing/2017/decorative" val="1"/>
+              </a:ext>
+            </a:extLst>
+          </p:cNvPr>
+          <p:cNvSpPr>
+            <a:spLocks noGrp="1" noRot="1" noChangeAspect="1" noMove="1" noResize="1" noEditPoints="1" noAdjustHandles="1" noChangeArrowheads="1" noChangeShapeType="1" noTextEdit="1"/>
+          </p:cNvSpPr>
+          <p:nvPr>
+            <p:extLst>
+              <p:ext uri="{386F3935-93C4-4BCD-93E2-E3B085C9AB24}">
+                <p16:designElem xmlns:p16="http://schemas.microsoft.com/office/powerpoint/2015/main" val="1"/>
+              </p:ext>
+            </p:extLst>
+          </p:nvPr>
+        </p:nvSpPr>
+        <p:spPr>
+          <a:xfrm>
+            <a:off x="0" y="0"/>
+            <a:ext cx="457200" cy="6858000"/>
+          </a:xfrm>
+          <a:prstGeom prst="rect">
+            <a:avLst/>
+          </a:prstGeom>
+          <a:solidFill>
+            <a:srgbClr val="303030"/>
+          </a:solidFill>
+          <a:ln>
+            <a:noFill/>
+          </a:ln>
+        </p:spPr>
+        <p:style>
+          <a:lnRef idx="2">
+            <a:schemeClr val="accent1">
+              <a:shade val="50000"/>
+            </a:schemeClr>
+          </a:lnRef>
+          <a:fillRef idx="1">
+            <a:schemeClr val="accent1"/>
+          </a:fillRef>
+          <a:effectRef idx="0">
+            <a:schemeClr val="accent1"/>
+          </a:effectRef>
+          <a:fontRef idx="minor">
+            <a:schemeClr val="lt1"/>
+          </a:fontRef>
+        </p:style>
+      </p:sp>
+      <p:sp useBgFill="1">
+        <p:nvSpPr>
+          <p:cNvPr id="13" name="Rectangle 12">
+            <a:extLst>
+              <a:ext uri="{FF2B5EF4-FFF2-40B4-BE49-F238E27FC236}">
+                <a16:creationId xmlns:a16="http://schemas.microsoft.com/office/drawing/2014/main" id="{79C8665A-B6C6-46BB-9012-A922385678AC}"/>
+              </a:ext>
+              <a:ext uri="{C183D7F6-B498-43B3-948B-1728B52AA6E4}">
+                <adec:decorative xmlns:adec="http://schemas.microsoft.com/office/drawing/2017/decorative" val="1"/>
+              </a:ext>
+            </a:extLst>
+          </p:cNvPr>
+          <p:cNvSpPr>
+            <a:spLocks noGrp="1" noRot="1" noChangeAspect="1" noMove="1" noResize="1" noEditPoints="1" noAdjustHandles="1" noChangeArrowheads="1" noChangeShapeType="1" noTextEdit="1"/>
+          </p:cNvSpPr>
+          <p:nvPr>
+            <p:extLst>
+              <p:ext uri="{386F3935-93C4-4BCD-93E2-E3B085C9AB24}">
+                <p16:designElem xmlns:p16="http://schemas.microsoft.com/office/powerpoint/2015/main" val="1"/>
+              </p:ext>
+            </p:extLst>
+          </p:nvPr>
+        </p:nvSpPr>
+        <p:spPr>
+          <a:xfrm>
+            <a:off x="0" y="0"/>
+            <a:ext cx="12192000" cy="6858000"/>
+          </a:xfrm>
+          <a:prstGeom prst="rect">
+            <a:avLst/>
+          </a:prstGeom>
+          <a:ln>
+            <a:noFill/>
+          </a:ln>
+        </p:spPr>
+        <p:style>
+          <a:lnRef idx="2">
+            <a:schemeClr val="accent1">
+              <a:shade val="50000"/>
+            </a:schemeClr>
+          </a:lnRef>
+          <a:fillRef idx="1">
+            <a:schemeClr val="accent1"/>
+          </a:fillRef>
+          <a:effectRef idx="0">
+            <a:schemeClr val="accent1"/>
+          </a:effectRef>
+          <a:fontRef idx="minor">
+            <a:schemeClr val="lt1"/>
+          </a:fontRef>
+        </p:style>
+        <p:txBody>
+          <a:bodyPr rtlCol="0" anchor="ctr"/>
+          <a:lstStyle/>
+          <a:p>
+            <a:pPr algn="ctr"/>
+            <a:endParaRPr lang="en-US"/>
+          </a:p>
+        </p:txBody>
+      </p:sp>
+      <p:sp>
+        <p:nvSpPr>
+          <p:cNvPr id="4" name="Title 3">
+            <a:extLst>
+              <a:ext uri="{FF2B5EF4-FFF2-40B4-BE49-F238E27FC236}">
+                <a16:creationId xmlns:a16="http://schemas.microsoft.com/office/drawing/2014/main" id="{ED552D37-8C90-4CF5-AF09-B18064F5BF56}"/>
+              </a:ext>
+            </a:extLst>
+          </p:cNvPr>
+          <p:cNvSpPr>
+            <a:spLocks noGrp="1"/>
+          </p:cNvSpPr>
+          <p:nvPr>
+            <p:ph type="title"/>
+          </p:nvPr>
+        </p:nvSpPr>
+        <p:spPr>
+          <a:xfrm>
+            <a:off x="1261872" y="758952"/>
+            <a:ext cx="9418320" cy="4041648"/>
+          </a:xfrm>
+        </p:spPr>
+        <p:txBody>
+          <a:bodyPr vert="horz" lIns="91440" tIns="45720" rIns="91440" bIns="45720" rtlCol="0" anchor="b">
+            <a:normAutofit/>
+          </a:bodyPr>
+          <a:lstStyle/>
+          <a:p>
+            <a:r>
+              <a:rPr lang="en-US" dirty="0"/>
+              <a:t>Why do we model data?</a:t>
+            </a:r>
+          </a:p>
+        </p:txBody>
+      </p:sp>
+      <p:sp>
+        <p:nvSpPr>
+          <p:cNvPr id="15" name="Rectangle 14">
+            <a:extLst>
+              <a:ext uri="{FF2B5EF4-FFF2-40B4-BE49-F238E27FC236}">
+                <a16:creationId xmlns:a16="http://schemas.microsoft.com/office/drawing/2014/main" id="{2D8964DE-AB9E-402E-8B81-8AA9BB47981B}"/>
+              </a:ext>
+              <a:ext uri="{C183D7F6-B498-43B3-948B-1728B52AA6E4}">
+                <adec:decorative xmlns:adec="http://schemas.microsoft.com/office/drawing/2017/decorative" val="1"/>
+              </a:ext>
+            </a:extLst>
+          </p:cNvPr>
+          <p:cNvSpPr>
+            <a:spLocks noGrp="1" noRot="1" noChangeAspect="1" noMove="1" noResize="1" noEditPoints="1" noAdjustHandles="1" noChangeArrowheads="1" noChangeShapeType="1" noTextEdit="1"/>
+          </p:cNvSpPr>
+          <p:nvPr>
+            <p:extLst>
+              <p:ext uri="{386F3935-93C4-4BCD-93E2-E3B085C9AB24}">
+                <p16:designElem xmlns:p16="http://schemas.microsoft.com/office/powerpoint/2015/main" val="1"/>
+              </p:ext>
+            </p:extLst>
+          </p:nvPr>
+        </p:nvSpPr>
+        <p:spPr>
+          <a:xfrm>
+            <a:off x="0" y="0"/>
+            <a:ext cx="457200" cy="6858000"/>
+          </a:xfrm>
+          <a:prstGeom prst="rect">
+            <a:avLst/>
+          </a:prstGeom>
+          <a:solidFill>
+            <a:schemeClr val="accent1"/>
+          </a:solidFill>
+          <a:ln>
+            <a:noFill/>
+          </a:ln>
+        </p:spPr>
+        <p:style>
+          <a:lnRef idx="2">
+            <a:schemeClr val="accent1">
+              <a:shade val="50000"/>
+            </a:schemeClr>
+          </a:lnRef>
+          <a:fillRef idx="1">
+            <a:schemeClr val="accent1"/>
+          </a:fillRef>
+          <a:effectRef idx="0">
+            <a:schemeClr val="accent1"/>
+          </a:effectRef>
+          <a:fontRef idx="minor">
+            <a:schemeClr val="lt1"/>
+          </a:fontRef>
+        </p:style>
+      </p:sp>
+      <p:sp>
+        <p:nvSpPr>
+          <p:cNvPr id="17" name="Rectangle 16">
+            <a:extLst>
+              <a:ext uri="{FF2B5EF4-FFF2-40B4-BE49-F238E27FC236}">
+                <a16:creationId xmlns:a16="http://schemas.microsoft.com/office/drawing/2014/main" id="{0361BE5E-E17F-47E3-AF50-969EA826BEE1}"/>
+              </a:ext>
+              <a:ext uri="{C183D7F6-B498-43B3-948B-1728B52AA6E4}">
+                <adec:decorative xmlns:adec="http://schemas.microsoft.com/office/drawing/2017/decorative" val="1"/>
+              </a:ext>
+            </a:extLst>
+          </p:cNvPr>
+          <p:cNvSpPr>
+            <a:spLocks noGrp="1" noRot="1" noChangeAspect="1" noMove="1" noResize="1" noEditPoints="1" noAdjustHandles="1" noChangeArrowheads="1" noChangeShapeType="1" noTextEdit="1"/>
+          </p:cNvSpPr>
+          <p:nvPr>
+            <p:extLst>
+              <p:ext uri="{386F3935-93C4-4BCD-93E2-E3B085C9AB24}">
+                <p16:designElem xmlns:p16="http://schemas.microsoft.com/office/powerpoint/2015/main" val="1"/>
+              </p:ext>
+            </p:extLst>
+          </p:nvPr>
+        </p:nvSpPr>
+        <p:spPr>
+          <a:xfrm>
+            <a:off x="11292840" y="0"/>
+            <a:ext cx="914400" cy="6858000"/>
+          </a:xfrm>
+          <a:prstGeom prst="rect">
+            <a:avLst/>
+          </a:prstGeom>
+          <a:solidFill>
+            <a:schemeClr val="tx2">
+              <a:lumMod val="75000"/>
+            </a:schemeClr>
+          </a:solidFill>
+          <a:ln>
+            <a:noFill/>
+          </a:ln>
+        </p:spPr>
+        <p:style>
+          <a:lnRef idx="2">
+            <a:schemeClr val="accent1">
+              <a:shade val="50000"/>
+            </a:schemeClr>
+          </a:lnRef>
+          <a:fillRef idx="1">
+            <a:schemeClr val="accent1"/>
+          </a:fillRef>
+          <a:effectRef idx="0">
+            <a:schemeClr val="accent1"/>
+          </a:effectRef>
+          <a:fontRef idx="minor">
+            <a:schemeClr val="lt1"/>
+          </a:fontRef>
+        </p:style>
+      </p:sp>
+    </p:spTree>
+    <p:extLst>
+      <p:ext uri="{BB962C8B-B14F-4D97-AF65-F5344CB8AC3E}">
+        <p14:creationId xmlns:p14="http://schemas.microsoft.com/office/powerpoint/2010/main" val="4168405491"/>
+      </p:ext>
+    </p:extLst>
+  </p:cSld>
+  <p:clrMapOvr>
+    <a:overrideClrMapping bg1="lt1" tx1="dk1" bg2="lt2" tx2="dk2" accent1="accent1" accent2="accent2" accent3="accent3" accent4="accent4" accent5="accent5" accent6="accent6" hlink="hlink" folHlink="folHlink"/>
+  </p:clrMapOvr>
+</p:sld>
+</file>
+
+<file path=ppt/slides/slide9.xml><?xml version="1.0" encoding="utf-8"?>
+<p:sld xmlns:a="http://schemas.openxmlformats.org/drawingml/2006/main" xmlns:r="http://schemas.openxmlformats.org/officeDocument/2006/relationships" xmlns:p="http://schemas.openxmlformats.org/presentationml/2006/main">
+  <p:cSld>
+    <p:spTree>
+      <p:nvGrpSpPr>
+        <p:cNvPr id="1" name=""/>
+        <p:cNvGrpSpPr/>
+        <p:nvPr/>
+      </p:nvGrpSpPr>
+      <p:grpSpPr>
+        <a:xfrm>
+          <a:off x="0" y="0"/>
+          <a:ext cx="0" cy="0"/>
+          <a:chOff x="0" y="0"/>
+          <a:chExt cx="0" cy="0"/>
+        </a:xfrm>
+      </p:grpSpPr>
+      <p:sp>
+        <p:nvSpPr>
+          <p:cNvPr id="2" name="Title 1">
+            <a:extLst>
+              <a:ext uri="{FF2B5EF4-FFF2-40B4-BE49-F238E27FC236}">
+                <a16:creationId xmlns:a16="http://schemas.microsoft.com/office/drawing/2014/main" id="{616086BB-A461-49CD-94D5-50E696887F47}"/>
+              </a:ext>
+            </a:extLst>
+          </p:cNvPr>
+          <p:cNvSpPr>
+            <a:spLocks noGrp="1"/>
+          </p:cNvSpPr>
+          <p:nvPr>
+            <p:ph type="title"/>
+          </p:nvPr>
+        </p:nvSpPr>
+        <p:spPr>
+          <a:xfrm>
+            <a:off x="685800" y="764373"/>
+            <a:ext cx="3687417" cy="1920372"/>
+          </a:xfrm>
+        </p:spPr>
+        <p:txBody>
+          <a:bodyPr>
+            <a:normAutofit/>
+          </a:bodyPr>
+          <a:lstStyle/>
+          <a:p>
+            <a:pPr algn="l"/>
+            <a:r>
+              <a:rPr lang="en-US" sz="3600" dirty="0"/>
+              <a:t>Degrees of relationships</a:t>
+            </a:r>
+          </a:p>
+        </p:txBody>
+      </p:sp>
+      <p:sp>
+        <p:nvSpPr>
+          <p:cNvPr id="3" name="Content Placeholder 2">
+            <a:extLst>
+              <a:ext uri="{FF2B5EF4-FFF2-40B4-BE49-F238E27FC236}">
+                <a16:creationId xmlns:a16="http://schemas.microsoft.com/office/drawing/2014/main" id="{4008AB50-1DD5-47E2-B0BD-686A7799A78F}"/>
+              </a:ext>
+            </a:extLst>
+          </p:cNvPr>
+          <p:cNvSpPr>
+            <a:spLocks noGrp="1"/>
+          </p:cNvSpPr>
+          <p:nvPr>
+            <p:ph idx="1"/>
+          </p:nvPr>
+        </p:nvSpPr>
+        <p:spPr>
+          <a:xfrm>
+            <a:off x="685800" y="2821774"/>
+            <a:ext cx="3687417" cy="3148329"/>
+          </a:xfrm>
+        </p:spPr>
+        <p:txBody>
+          <a:bodyPr>
+            <a:normAutofit/>
+          </a:bodyPr>
+          <a:lstStyle/>
+          <a:p>
+            <a:r>
+              <a:rPr lang="en-US" sz="1600" dirty="0"/>
+              <a:t>Relationship can be mandatory or optional</a:t>
+            </a:r>
+          </a:p>
+          <a:p>
+            <a:pPr lvl="1"/>
+            <a:r>
+              <a:rPr lang="en-US" sz="1600" dirty="0">
+                <a:solidFill>
+                  <a:schemeClr val="tx1"/>
+                </a:solidFill>
+              </a:rPr>
+              <a:t>O = optional</a:t>
+            </a:r>
+          </a:p>
+          <a:p>
+            <a:pPr lvl="1"/>
+            <a:r>
+              <a:rPr lang="en-US" sz="1600" dirty="0">
+                <a:solidFill>
+                  <a:schemeClr val="tx1"/>
+                </a:solidFill>
+              </a:rPr>
+              <a:t>| </a:t>
+            </a:r>
+            <a:r>
+              <a:rPr lang="en-US" sz="1600">
+                <a:solidFill>
+                  <a:schemeClr val="tx1"/>
+                </a:solidFill>
+              </a:rPr>
+              <a:t>= mandatory</a:t>
+            </a:r>
+            <a:endParaRPr lang="en-US" sz="1600" dirty="0">
+              <a:solidFill>
+                <a:schemeClr val="tx1"/>
+              </a:solidFill>
+            </a:endParaRPr>
+          </a:p>
+          <a:p>
+            <a:r>
+              <a:rPr lang="en-US" sz="1600" dirty="0"/>
+              <a:t>Cardinality = relationship of data in one entity to another entity (table to another table)</a:t>
+            </a:r>
+          </a:p>
+          <a:p>
+            <a:pPr lvl="1"/>
+            <a:r>
+              <a:rPr lang="en-US" sz="1400" dirty="0">
+                <a:solidFill>
+                  <a:schemeClr val="tx1"/>
+                </a:solidFill>
+              </a:rPr>
+              <a:t>O = zero</a:t>
+            </a:r>
+          </a:p>
+          <a:p>
+            <a:pPr lvl="1"/>
+            <a:r>
+              <a:rPr lang="en-US" sz="1400" dirty="0">
+                <a:solidFill>
+                  <a:schemeClr val="tx1"/>
+                </a:solidFill>
+              </a:rPr>
+              <a:t>| = one</a:t>
+            </a:r>
+          </a:p>
+          <a:p>
+            <a:pPr lvl="1"/>
+            <a:r>
+              <a:rPr lang="en-US" sz="1400" dirty="0">
+                <a:solidFill>
+                  <a:schemeClr val="tx1"/>
+                </a:solidFill>
+              </a:rPr>
+              <a:t>&gt; = many</a:t>
+            </a:r>
+          </a:p>
+          <a:p>
+            <a:pPr lvl="1"/>
+            <a:endParaRPr lang="en-US" sz="1400" dirty="0">
+              <a:solidFill>
+                <a:schemeClr val="tx1"/>
+              </a:solidFill>
+            </a:endParaRPr>
+          </a:p>
+          <a:p>
+            <a:pPr marL="457200" lvl="1" indent="0">
+              <a:buNone/>
+            </a:pPr>
+            <a:endParaRPr lang="en-US" sz="1400" dirty="0">
+              <a:solidFill>
+                <a:schemeClr val="tx1"/>
+              </a:solidFill>
+            </a:endParaRPr>
+          </a:p>
+        </p:txBody>
+      </p:sp>
+      <p:pic>
+        <p:nvPicPr>
+          <p:cNvPr id="7" name="Picture 6">
+            <a:extLst>
+              <a:ext uri="{FF2B5EF4-FFF2-40B4-BE49-F238E27FC236}">
+                <a16:creationId xmlns:a16="http://schemas.microsoft.com/office/drawing/2014/main" id="{AFA6D441-3AB7-4173-8B91-DC6307912395}"/>
+              </a:ext>
+            </a:extLst>
+          </p:cNvPr>
+          <p:cNvPicPr>
+            <a:picLocks noChangeAspect="1"/>
+          </p:cNvPicPr>
+          <p:nvPr/>
+        </p:nvPicPr>
+        <p:blipFill>
+          <a:blip r:embed="rId2"/>
+          <a:stretch>
+            <a:fillRect/>
+          </a:stretch>
+        </p:blipFill>
+        <p:spPr>
+          <a:xfrm>
+            <a:off x="6096000" y="0"/>
+            <a:ext cx="4423409" cy="6857999"/>
+          </a:xfrm>
+          <a:prstGeom prst="rect">
+            <a:avLst/>
+          </a:prstGeom>
+        </p:spPr>
+      </p:pic>
+    </p:spTree>
+    <p:extLst>
+      <p:ext uri="{BB962C8B-B14F-4D97-AF65-F5344CB8AC3E}">
+        <p14:creationId xmlns:p14="http://schemas.microsoft.com/office/powerpoint/2010/main" val="3957850518"/>
+      </p:ext>
+    </p:extLst>
+  </p:cSld>
+  <p:clrMapOvr>
+    <a:masterClrMapping/>
+  </p:clrMapOvr>
 </p:sld>
 </file>
 

</xml_diff>